<commit_message>
Added sign language demonstration image
</commit_message>
<xml_diff>
--- a/docs/poster.pptx
+++ b/docs/poster.pptx
@@ -3507,6 +3507,42 @@
           </a:p>
         </p:txBody>
       </p:sp>
+      <p:pic>
+        <p:nvPicPr>
+          <p:cNvPr id="3" name="Picture 2" descr="A close up of text on a white background&#10;&#10;Description generated with high confidence">
+            <a:extLst>
+              <a:ext uri="{FF2B5EF4-FFF2-40B4-BE49-F238E27FC236}">
+                <a16:creationId xmlns:a16="http://schemas.microsoft.com/office/drawing/2014/main" id="{BAA4E24C-D968-4146-A451-2EF4292F59A3}"/>
+              </a:ext>
+            </a:extLst>
+          </p:cNvPr>
+          <p:cNvPicPr>
+            <a:picLocks noChangeAspect="1"/>
+          </p:cNvPicPr>
+          <p:nvPr/>
+        </p:nvPicPr>
+        <p:blipFill>
+          <a:blip r:embed="rId3">
+            <a:extLst>
+              <a:ext uri="{28A0092B-C50C-407E-A947-70E740481C1C}">
+                <a14:useLocalDpi xmlns:a14="http://schemas.microsoft.com/office/drawing/2010/main" val="0"/>
+              </a:ext>
+            </a:extLst>
+          </a:blip>
+          <a:stretch>
+            <a:fillRect/>
+          </a:stretch>
+        </p:blipFill>
+        <p:spPr>
+          <a:xfrm>
+            <a:off x="914401" y="12354608"/>
+            <a:ext cx="8345065" cy="4658375"/>
+          </a:xfrm>
+          <a:prstGeom prst="rect">
+            <a:avLst/>
+          </a:prstGeom>
+        </p:spPr>
+      </p:pic>
     </p:spTree>
     <p:extLst>
       <p:ext uri="{BB962C8B-B14F-4D97-AF65-F5344CB8AC3E}">

</xml_diff>

<commit_message>
Poster draft, some work on model
</commit_message>
<xml_diff>
--- a/docs/poster.pptx
+++ b/docs/poster.pptx
@@ -11,20 +11,20 @@
   <p:notesSz cx="6858000" cy="9144000"/>
   <p:embeddedFontLst>
     <p:embeddedFont>
-      <p:font typeface="Calibri" panose="020F0502020204030204" pitchFamily="34" charset="0"/>
+      <p:font typeface="Calibri Light" panose="020F0302020204030204" pitchFamily="34" charset="0"/>
       <p:regular r:id="rId3"/>
-      <p:bold r:id="rId4"/>
-      <p:italic r:id="rId5"/>
-      <p:boldItalic r:id="rId6"/>
+      <p:italic r:id="rId4"/>
     </p:embeddedFont>
     <p:embeddedFont>
       <p:font typeface="BentonSans Regular" panose="02000503000000020004" pitchFamily="50" charset="0"/>
-      <p:regular r:id="rId7"/>
+      <p:regular r:id="rId5"/>
     </p:embeddedFont>
     <p:embeddedFont>
-      <p:font typeface="Calibri Light" panose="020F0302020204030204" pitchFamily="34" charset="0"/>
-      <p:regular r:id="rId8"/>
-      <p:italic r:id="rId9"/>
+      <p:font typeface="Calibri" panose="020F0502020204030204" pitchFamily="34" charset="0"/>
+      <p:regular r:id="rId6"/>
+      <p:bold r:id="rId7"/>
+      <p:italic r:id="rId8"/>
+      <p:boldItalic r:id="rId9"/>
     </p:embeddedFont>
   </p:embeddedFontLst>
   <p:defaultTextStyle>
@@ -141,6 +141,1036 @@
 </p:presentation>
 </file>
 
+<file path=ppt/charts/chart1.xml><?xml version="1.0" encoding="utf-8"?>
+<c:chartSpace xmlns:c="http://schemas.openxmlformats.org/drawingml/2006/chart" xmlns:a="http://schemas.openxmlformats.org/drawingml/2006/main" xmlns:r="http://schemas.openxmlformats.org/officeDocument/2006/relationships" xmlns:c16r2="http://schemas.microsoft.com/office/drawing/2015/06/chart">
+  <c:date1904 val="0"/>
+  <c:lang val="en-US"/>
+  <c:roundedCorners val="0"/>
+  <mc:AlternateContent xmlns:mc="http://schemas.openxmlformats.org/markup-compatibility/2006">
+    <mc:Choice xmlns:c14="http://schemas.microsoft.com/office/drawing/2007/8/2/chart" Requires="c14">
+      <c14:style val="102"/>
+    </mc:Choice>
+    <mc:Fallback>
+      <c:style val="2"/>
+    </mc:Fallback>
+  </mc:AlternateContent>
+  <c:chart>
+    <c:title>
+      <c:overlay val="0"/>
+      <c:spPr>
+        <a:noFill/>
+        <a:ln>
+          <a:noFill/>
+        </a:ln>
+        <a:effectLst/>
+      </c:spPr>
+      <c:txPr>
+        <a:bodyPr rot="0" spcFirstLastPara="1" vertOverflow="ellipsis" vert="horz" wrap="square" anchor="ctr" anchorCtr="1"/>
+        <a:lstStyle/>
+        <a:p>
+          <a:pPr>
+            <a:defRPr sz="1862" b="0" i="0" u="none" strike="noStrike" kern="1200" spc="0" baseline="0">
+              <a:solidFill>
+                <a:schemeClr val="tx1">
+                  <a:lumMod val="65000"/>
+                  <a:lumOff val="35000"/>
+                </a:schemeClr>
+              </a:solidFill>
+              <a:latin typeface="+mn-lt"/>
+              <a:ea typeface="+mn-ea"/>
+              <a:cs typeface="+mn-cs"/>
+            </a:defRPr>
+          </a:pPr>
+          <a:endParaRPr lang="en-US"/>
+        </a:p>
+      </c:txPr>
+    </c:title>
+    <c:autoTitleDeleted val="0"/>
+    <c:plotArea>
+      <c:layout>
+        <c:manualLayout>
+          <c:layoutTarget val="inner"/>
+          <c:xMode val="edge"/>
+          <c:yMode val="edge"/>
+          <c:x val="5.5700133737773952E-2"/>
+          <c:y val="4.8735515769412208E-2"/>
+          <c:w val="0.96229364181096444"/>
+          <c:h val="0.7931997070455159"/>
+        </c:manualLayout>
+      </c:layout>
+      <c:lineChart>
+        <c:grouping val="standard"/>
+        <c:varyColors val="0"/>
+        <c:ser>
+          <c:idx val="0"/>
+          <c:order val="0"/>
+          <c:tx>
+            <c:strRef>
+              <c:f>Sheet1!$B$1</c:f>
+              <c:strCache>
+                <c:ptCount val="1"/>
+                <c:pt idx="0">
+                  <c:v>Series 1</c:v>
+                </c:pt>
+              </c:strCache>
+            </c:strRef>
+          </c:tx>
+          <c:spPr>
+            <a:ln w="28575" cap="rnd">
+              <a:solidFill>
+                <a:schemeClr val="accent1"/>
+              </a:solidFill>
+              <a:round/>
+            </a:ln>
+            <a:effectLst/>
+          </c:spPr>
+          <c:marker>
+            <c:symbol val="none"/>
+          </c:marker>
+          <c:cat>
+            <c:strRef>
+              <c:f>Sheet1!$A$2:$A$5</c:f>
+              <c:strCache>
+                <c:ptCount val="4"/>
+                <c:pt idx="0">
+                  <c:v>Category 1</c:v>
+                </c:pt>
+                <c:pt idx="1">
+                  <c:v>Category 2</c:v>
+                </c:pt>
+                <c:pt idx="2">
+                  <c:v>Category 3</c:v>
+                </c:pt>
+                <c:pt idx="3">
+                  <c:v>Category 4</c:v>
+                </c:pt>
+              </c:strCache>
+            </c:strRef>
+          </c:cat>
+          <c:val>
+            <c:numRef>
+              <c:f>Sheet1!$B$2:$B$5</c:f>
+              <c:numCache>
+                <c:formatCode>General</c:formatCode>
+                <c:ptCount val="4"/>
+                <c:pt idx="0">
+                  <c:v>4.3</c:v>
+                </c:pt>
+                <c:pt idx="1">
+                  <c:v>2.5</c:v>
+                </c:pt>
+                <c:pt idx="2">
+                  <c:v>3.5</c:v>
+                </c:pt>
+                <c:pt idx="3">
+                  <c:v>4.5</c:v>
+                </c:pt>
+              </c:numCache>
+            </c:numRef>
+          </c:val>
+          <c:smooth val="0"/>
+          <c:extLst>
+            <c:ext xmlns:c16="http://schemas.microsoft.com/office/drawing/2014/chart" uri="{C3380CC4-5D6E-409C-BE32-E72D297353CC}">
+              <c16:uniqueId val="{00000000-7F53-4704-9BCB-60800BB09BA9}"/>
+            </c:ext>
+          </c:extLst>
+        </c:ser>
+        <c:ser>
+          <c:idx val="1"/>
+          <c:order val="1"/>
+          <c:tx>
+            <c:strRef>
+              <c:f>Sheet1!$C$1</c:f>
+              <c:strCache>
+                <c:ptCount val="1"/>
+                <c:pt idx="0">
+                  <c:v>Series 2</c:v>
+                </c:pt>
+              </c:strCache>
+            </c:strRef>
+          </c:tx>
+          <c:spPr>
+            <a:ln w="28575" cap="rnd">
+              <a:solidFill>
+                <a:schemeClr val="accent2"/>
+              </a:solidFill>
+              <a:round/>
+            </a:ln>
+            <a:effectLst/>
+          </c:spPr>
+          <c:marker>
+            <c:symbol val="none"/>
+          </c:marker>
+          <c:cat>
+            <c:strRef>
+              <c:f>Sheet1!$A$2:$A$5</c:f>
+              <c:strCache>
+                <c:ptCount val="4"/>
+                <c:pt idx="0">
+                  <c:v>Category 1</c:v>
+                </c:pt>
+                <c:pt idx="1">
+                  <c:v>Category 2</c:v>
+                </c:pt>
+                <c:pt idx="2">
+                  <c:v>Category 3</c:v>
+                </c:pt>
+                <c:pt idx="3">
+                  <c:v>Category 4</c:v>
+                </c:pt>
+              </c:strCache>
+            </c:strRef>
+          </c:cat>
+          <c:val>
+            <c:numRef>
+              <c:f>Sheet1!$C$2:$C$5</c:f>
+              <c:numCache>
+                <c:formatCode>General</c:formatCode>
+                <c:ptCount val="4"/>
+                <c:pt idx="0">
+                  <c:v>2.4</c:v>
+                </c:pt>
+                <c:pt idx="1">
+                  <c:v>4.4000000000000004</c:v>
+                </c:pt>
+                <c:pt idx="2">
+                  <c:v>1.8</c:v>
+                </c:pt>
+                <c:pt idx="3">
+                  <c:v>2.8</c:v>
+                </c:pt>
+              </c:numCache>
+            </c:numRef>
+          </c:val>
+          <c:smooth val="0"/>
+          <c:extLst>
+            <c:ext xmlns:c16="http://schemas.microsoft.com/office/drawing/2014/chart" uri="{C3380CC4-5D6E-409C-BE32-E72D297353CC}">
+              <c16:uniqueId val="{00000001-7F53-4704-9BCB-60800BB09BA9}"/>
+            </c:ext>
+          </c:extLst>
+        </c:ser>
+        <c:ser>
+          <c:idx val="2"/>
+          <c:order val="2"/>
+          <c:tx>
+            <c:strRef>
+              <c:f>Sheet1!$D$1</c:f>
+              <c:strCache>
+                <c:ptCount val="1"/>
+                <c:pt idx="0">
+                  <c:v>Series 3</c:v>
+                </c:pt>
+              </c:strCache>
+            </c:strRef>
+          </c:tx>
+          <c:spPr>
+            <a:ln w="28575" cap="rnd">
+              <a:solidFill>
+                <a:schemeClr val="accent3"/>
+              </a:solidFill>
+              <a:round/>
+            </a:ln>
+            <a:effectLst/>
+          </c:spPr>
+          <c:marker>
+            <c:symbol val="none"/>
+          </c:marker>
+          <c:cat>
+            <c:strRef>
+              <c:f>Sheet1!$A$2:$A$5</c:f>
+              <c:strCache>
+                <c:ptCount val="4"/>
+                <c:pt idx="0">
+                  <c:v>Category 1</c:v>
+                </c:pt>
+                <c:pt idx="1">
+                  <c:v>Category 2</c:v>
+                </c:pt>
+                <c:pt idx="2">
+                  <c:v>Category 3</c:v>
+                </c:pt>
+                <c:pt idx="3">
+                  <c:v>Category 4</c:v>
+                </c:pt>
+              </c:strCache>
+            </c:strRef>
+          </c:cat>
+          <c:val>
+            <c:numRef>
+              <c:f>Sheet1!$D$2:$D$5</c:f>
+              <c:numCache>
+                <c:formatCode>General</c:formatCode>
+                <c:ptCount val="4"/>
+                <c:pt idx="0">
+                  <c:v>2</c:v>
+                </c:pt>
+                <c:pt idx="1">
+                  <c:v>2</c:v>
+                </c:pt>
+                <c:pt idx="2">
+                  <c:v>3</c:v>
+                </c:pt>
+                <c:pt idx="3">
+                  <c:v>5</c:v>
+                </c:pt>
+              </c:numCache>
+            </c:numRef>
+          </c:val>
+          <c:smooth val="0"/>
+          <c:extLst>
+            <c:ext xmlns:c16="http://schemas.microsoft.com/office/drawing/2014/chart" uri="{C3380CC4-5D6E-409C-BE32-E72D297353CC}">
+              <c16:uniqueId val="{00000002-7F53-4704-9BCB-60800BB09BA9}"/>
+            </c:ext>
+          </c:extLst>
+        </c:ser>
+        <c:dLbls>
+          <c:showLegendKey val="0"/>
+          <c:showVal val="0"/>
+          <c:showCatName val="0"/>
+          <c:showSerName val="0"/>
+          <c:showPercent val="0"/>
+          <c:showBubbleSize val="0"/>
+        </c:dLbls>
+        <c:smooth val="0"/>
+        <c:axId val="1417540416"/>
+        <c:axId val="1417793680"/>
+      </c:lineChart>
+      <c:catAx>
+        <c:axId val="1417540416"/>
+        <c:scaling>
+          <c:orientation val="minMax"/>
+        </c:scaling>
+        <c:delete val="0"/>
+        <c:axPos val="b"/>
+        <c:numFmt formatCode="General" sourceLinked="1"/>
+        <c:majorTickMark val="none"/>
+        <c:minorTickMark val="none"/>
+        <c:tickLblPos val="nextTo"/>
+        <c:spPr>
+          <a:noFill/>
+          <a:ln w="9525" cap="flat" cmpd="sng" algn="ctr">
+            <a:solidFill>
+              <a:schemeClr val="tx1">
+                <a:lumMod val="15000"/>
+                <a:lumOff val="85000"/>
+              </a:schemeClr>
+            </a:solidFill>
+            <a:round/>
+          </a:ln>
+          <a:effectLst/>
+        </c:spPr>
+        <c:txPr>
+          <a:bodyPr rot="-60000000" spcFirstLastPara="1" vertOverflow="ellipsis" vert="horz" wrap="square" anchor="ctr" anchorCtr="1"/>
+          <a:lstStyle/>
+          <a:p>
+            <a:pPr>
+              <a:defRPr sz="1197" b="0" i="0" u="none" strike="noStrike" kern="1200" baseline="0">
+                <a:solidFill>
+                  <a:schemeClr val="tx1">
+                    <a:lumMod val="65000"/>
+                    <a:lumOff val="35000"/>
+                  </a:schemeClr>
+                </a:solidFill>
+                <a:latin typeface="+mn-lt"/>
+                <a:ea typeface="+mn-ea"/>
+                <a:cs typeface="+mn-cs"/>
+              </a:defRPr>
+            </a:pPr>
+            <a:endParaRPr lang="en-US"/>
+          </a:p>
+        </c:txPr>
+        <c:crossAx val="1417793680"/>
+        <c:crosses val="autoZero"/>
+        <c:auto val="1"/>
+        <c:lblAlgn val="ctr"/>
+        <c:lblOffset val="100"/>
+        <c:noMultiLvlLbl val="0"/>
+      </c:catAx>
+      <c:valAx>
+        <c:axId val="1417793680"/>
+        <c:scaling>
+          <c:orientation val="minMax"/>
+        </c:scaling>
+        <c:delete val="0"/>
+        <c:axPos val="l"/>
+        <c:majorGridlines>
+          <c:spPr>
+            <a:ln w="9525" cap="flat" cmpd="sng" algn="ctr">
+              <a:solidFill>
+                <a:schemeClr val="tx1">
+                  <a:lumMod val="15000"/>
+                  <a:lumOff val="85000"/>
+                </a:schemeClr>
+              </a:solidFill>
+              <a:round/>
+            </a:ln>
+            <a:effectLst/>
+          </c:spPr>
+        </c:majorGridlines>
+        <c:numFmt formatCode="General" sourceLinked="1"/>
+        <c:majorTickMark val="none"/>
+        <c:minorTickMark val="none"/>
+        <c:tickLblPos val="nextTo"/>
+        <c:spPr>
+          <a:noFill/>
+          <a:ln>
+            <a:noFill/>
+          </a:ln>
+          <a:effectLst/>
+        </c:spPr>
+        <c:txPr>
+          <a:bodyPr rot="-60000000" spcFirstLastPara="1" vertOverflow="ellipsis" vert="horz" wrap="square" anchor="ctr" anchorCtr="1"/>
+          <a:lstStyle/>
+          <a:p>
+            <a:pPr>
+              <a:defRPr sz="1197" b="0" i="0" u="none" strike="noStrike" kern="1200" baseline="0">
+                <a:solidFill>
+                  <a:schemeClr val="tx1">
+                    <a:lumMod val="65000"/>
+                    <a:lumOff val="35000"/>
+                  </a:schemeClr>
+                </a:solidFill>
+                <a:latin typeface="+mn-lt"/>
+                <a:ea typeface="+mn-ea"/>
+                <a:cs typeface="+mn-cs"/>
+              </a:defRPr>
+            </a:pPr>
+            <a:endParaRPr lang="en-US"/>
+          </a:p>
+        </c:txPr>
+        <c:crossAx val="1417540416"/>
+        <c:crosses val="autoZero"/>
+        <c:crossBetween val="between"/>
+      </c:valAx>
+      <c:spPr>
+        <a:noFill/>
+        <a:ln>
+          <a:noFill/>
+        </a:ln>
+        <a:effectLst/>
+      </c:spPr>
+    </c:plotArea>
+    <c:legend>
+      <c:legendPos val="b"/>
+      <c:overlay val="0"/>
+      <c:spPr>
+        <a:noFill/>
+        <a:ln>
+          <a:noFill/>
+        </a:ln>
+        <a:effectLst/>
+      </c:spPr>
+      <c:txPr>
+        <a:bodyPr rot="0" spcFirstLastPara="1" vertOverflow="ellipsis" vert="horz" wrap="square" anchor="ctr" anchorCtr="1"/>
+        <a:lstStyle/>
+        <a:p>
+          <a:pPr>
+            <a:defRPr sz="1197" b="0" i="0" u="none" strike="noStrike" kern="1200" baseline="0">
+              <a:solidFill>
+                <a:schemeClr val="tx1">
+                  <a:lumMod val="65000"/>
+                  <a:lumOff val="35000"/>
+                </a:schemeClr>
+              </a:solidFill>
+              <a:latin typeface="+mn-lt"/>
+              <a:ea typeface="+mn-ea"/>
+              <a:cs typeface="+mn-cs"/>
+            </a:defRPr>
+          </a:pPr>
+          <a:endParaRPr lang="en-US"/>
+        </a:p>
+      </c:txPr>
+    </c:legend>
+    <c:plotVisOnly val="1"/>
+    <c:dispBlanksAs val="gap"/>
+    <c:extLst>
+      <c:ext xmlns:c16r3="http://schemas.microsoft.com/office/drawing/2017/03/chart" uri="{56B9EC1D-385E-4148-901F-78D8002777C0}">
+        <c16r3:dataDisplayOptions16>
+          <c16r3:dispNaAsBlank val="1"/>
+        </c16r3:dataDisplayOptions16>
+      </c:ext>
+    </c:extLst>
+    <c:showDLblsOverMax val="0"/>
+  </c:chart>
+  <c:spPr>
+    <a:noFill/>
+    <a:ln>
+      <a:noFill/>
+    </a:ln>
+    <a:effectLst/>
+  </c:spPr>
+  <c:txPr>
+    <a:bodyPr/>
+    <a:lstStyle/>
+    <a:p>
+      <a:pPr>
+        <a:defRPr/>
+      </a:pPr>
+      <a:endParaRPr lang="en-US"/>
+    </a:p>
+  </c:txPr>
+  <c:externalData r:id="rId3">
+    <c:autoUpdate val="0"/>
+  </c:externalData>
+</c:chartSpace>
+</file>
+
+<file path=ppt/charts/colors1.xml><?xml version="1.0" encoding="utf-8"?>
+<cs:colorStyle xmlns:cs="http://schemas.microsoft.com/office/drawing/2012/chartStyle" xmlns:a="http://schemas.openxmlformats.org/drawingml/2006/main" meth="cycle" id="10">
+  <a:schemeClr val="accent1"/>
+  <a:schemeClr val="accent2"/>
+  <a:schemeClr val="accent3"/>
+  <a:schemeClr val="accent4"/>
+  <a:schemeClr val="accent5"/>
+  <a:schemeClr val="accent6"/>
+  <cs:variation/>
+  <cs:variation>
+    <a:lumMod val="60000"/>
+  </cs:variation>
+  <cs:variation>
+    <a:lumMod val="80000"/>
+    <a:lumOff val="20000"/>
+  </cs:variation>
+  <cs:variation>
+    <a:lumMod val="80000"/>
+  </cs:variation>
+  <cs:variation>
+    <a:lumMod val="60000"/>
+    <a:lumOff val="40000"/>
+  </cs:variation>
+  <cs:variation>
+    <a:lumMod val="50000"/>
+  </cs:variation>
+  <cs:variation>
+    <a:lumMod val="70000"/>
+    <a:lumOff val="30000"/>
+  </cs:variation>
+  <cs:variation>
+    <a:lumMod val="70000"/>
+  </cs:variation>
+  <cs:variation>
+    <a:lumMod val="50000"/>
+    <a:lumOff val="50000"/>
+  </cs:variation>
+</cs:colorStyle>
+</file>
+
+<file path=ppt/charts/style1.xml><?xml version="1.0" encoding="utf-8"?>
+<cs:chartStyle xmlns:cs="http://schemas.microsoft.com/office/drawing/2012/chartStyle" xmlns:a="http://schemas.openxmlformats.org/drawingml/2006/main" id="227">
+  <cs:axisTitle>
+    <cs:lnRef idx="0"/>
+    <cs:fillRef idx="0"/>
+    <cs:effectRef idx="0"/>
+    <cs:fontRef idx="minor">
+      <a:schemeClr val="tx1">
+        <a:lumMod val="65000"/>
+        <a:lumOff val="35000"/>
+      </a:schemeClr>
+    </cs:fontRef>
+    <cs:defRPr sz="1330" kern="1200"/>
+  </cs:axisTitle>
+  <cs:categoryAxis>
+    <cs:lnRef idx="0"/>
+    <cs:fillRef idx="0"/>
+    <cs:effectRef idx="0"/>
+    <cs:fontRef idx="minor">
+      <a:schemeClr val="tx1">
+        <a:lumMod val="65000"/>
+        <a:lumOff val="35000"/>
+      </a:schemeClr>
+    </cs:fontRef>
+    <cs:spPr>
+      <a:ln w="9525" cap="flat" cmpd="sng" algn="ctr">
+        <a:solidFill>
+          <a:schemeClr val="tx1">
+            <a:lumMod val="15000"/>
+            <a:lumOff val="85000"/>
+          </a:schemeClr>
+        </a:solidFill>
+        <a:round/>
+      </a:ln>
+    </cs:spPr>
+    <cs:defRPr sz="1197" kern="1200"/>
+  </cs:categoryAxis>
+  <cs:chartArea mods="allowNoFillOverride allowNoLineOverride">
+    <cs:lnRef idx="0"/>
+    <cs:fillRef idx="0"/>
+    <cs:effectRef idx="0"/>
+    <cs:fontRef idx="minor">
+      <a:schemeClr val="tx1"/>
+    </cs:fontRef>
+    <cs:spPr>
+      <a:solidFill>
+        <a:schemeClr val="bg1"/>
+      </a:solidFill>
+      <a:ln w="9525" cap="flat" cmpd="sng" algn="ctr">
+        <a:solidFill>
+          <a:schemeClr val="tx1">
+            <a:lumMod val="15000"/>
+            <a:lumOff val="85000"/>
+          </a:schemeClr>
+        </a:solidFill>
+        <a:round/>
+      </a:ln>
+    </cs:spPr>
+    <cs:defRPr sz="1330" kern="1200"/>
+  </cs:chartArea>
+  <cs:dataLabel>
+    <cs:lnRef idx="0"/>
+    <cs:fillRef idx="0"/>
+    <cs:effectRef idx="0"/>
+    <cs:fontRef idx="minor">
+      <a:schemeClr val="tx1">
+        <a:lumMod val="75000"/>
+        <a:lumOff val="25000"/>
+      </a:schemeClr>
+    </cs:fontRef>
+    <cs:defRPr sz="1197" kern="1200"/>
+  </cs:dataLabel>
+  <cs:dataLabelCallout>
+    <cs:lnRef idx="0"/>
+    <cs:fillRef idx="0"/>
+    <cs:effectRef idx="0"/>
+    <cs:fontRef idx="minor">
+      <a:schemeClr val="dk1">
+        <a:lumMod val="65000"/>
+        <a:lumOff val="35000"/>
+      </a:schemeClr>
+    </cs:fontRef>
+    <cs:spPr>
+      <a:solidFill>
+        <a:schemeClr val="lt1"/>
+      </a:solidFill>
+      <a:ln>
+        <a:solidFill>
+          <a:schemeClr val="dk1">
+            <a:lumMod val="25000"/>
+            <a:lumOff val="75000"/>
+          </a:schemeClr>
+        </a:solidFill>
+      </a:ln>
+    </cs:spPr>
+    <cs:defRPr sz="1197" kern="1200"/>
+    <cs:bodyPr rot="0" spcFirstLastPara="1" vertOverflow="clip" horzOverflow="clip" vert="horz" wrap="square" lIns="36576" tIns="18288" rIns="36576" bIns="18288" anchor="ctr" anchorCtr="1">
+      <a:spAutoFit/>
+    </cs:bodyPr>
+  </cs:dataLabelCallout>
+  <cs:dataPoint>
+    <cs:lnRef idx="0"/>
+    <cs:fillRef idx="1">
+      <cs:styleClr val="auto"/>
+    </cs:fillRef>
+    <cs:effectRef idx="0"/>
+    <cs:fontRef idx="minor">
+      <a:schemeClr val="tx1"/>
+    </cs:fontRef>
+    <cs:spPr>
+      <a:solidFill>
+        <a:schemeClr val="phClr"/>
+      </a:solidFill>
+    </cs:spPr>
+  </cs:dataPoint>
+  <cs:dataPoint3D>
+    <cs:lnRef idx="0"/>
+    <cs:fillRef idx="1">
+      <cs:styleClr val="auto"/>
+    </cs:fillRef>
+    <cs:effectRef idx="0"/>
+    <cs:fontRef idx="minor">
+      <a:schemeClr val="tx1"/>
+    </cs:fontRef>
+    <cs:spPr>
+      <a:solidFill>
+        <a:schemeClr val="phClr"/>
+      </a:solidFill>
+    </cs:spPr>
+  </cs:dataPoint3D>
+  <cs:dataPointLine>
+    <cs:lnRef idx="0">
+      <cs:styleClr val="auto"/>
+    </cs:lnRef>
+    <cs:fillRef idx="1"/>
+    <cs:effectRef idx="0"/>
+    <cs:fontRef idx="minor">
+      <a:schemeClr val="tx1"/>
+    </cs:fontRef>
+    <cs:spPr>
+      <a:ln w="28575" cap="rnd">
+        <a:solidFill>
+          <a:schemeClr val="phClr"/>
+        </a:solidFill>
+        <a:round/>
+      </a:ln>
+    </cs:spPr>
+  </cs:dataPointLine>
+  <cs:dataPointMarker>
+    <cs:lnRef idx="0">
+      <cs:styleClr val="auto"/>
+    </cs:lnRef>
+    <cs:fillRef idx="1">
+      <cs:styleClr val="auto"/>
+    </cs:fillRef>
+    <cs:effectRef idx="0"/>
+    <cs:fontRef idx="minor">
+      <a:schemeClr val="tx1"/>
+    </cs:fontRef>
+    <cs:spPr>
+      <a:solidFill>
+        <a:schemeClr val="phClr"/>
+      </a:solidFill>
+      <a:ln w="9525">
+        <a:solidFill>
+          <a:schemeClr val="phClr"/>
+        </a:solidFill>
+      </a:ln>
+    </cs:spPr>
+  </cs:dataPointMarker>
+  <cs:dataPointMarkerLayout symbol="circle" size="5"/>
+  <cs:dataPointWireframe>
+    <cs:lnRef idx="0">
+      <cs:styleClr val="auto"/>
+    </cs:lnRef>
+    <cs:fillRef idx="1"/>
+    <cs:effectRef idx="0"/>
+    <cs:fontRef idx="minor">
+      <a:schemeClr val="tx1"/>
+    </cs:fontRef>
+    <cs:spPr>
+      <a:ln w="9525" cap="rnd">
+        <a:solidFill>
+          <a:schemeClr val="phClr"/>
+        </a:solidFill>
+        <a:round/>
+      </a:ln>
+    </cs:spPr>
+  </cs:dataPointWireframe>
+  <cs:dataTable>
+    <cs:lnRef idx="0"/>
+    <cs:fillRef idx="0"/>
+    <cs:effectRef idx="0"/>
+    <cs:fontRef idx="minor">
+      <a:schemeClr val="tx1">
+        <a:lumMod val="65000"/>
+        <a:lumOff val="35000"/>
+      </a:schemeClr>
+    </cs:fontRef>
+    <cs:spPr>
+      <a:noFill/>
+      <a:ln w="9525" cap="flat" cmpd="sng" algn="ctr">
+        <a:solidFill>
+          <a:schemeClr val="tx1">
+            <a:lumMod val="15000"/>
+            <a:lumOff val="85000"/>
+          </a:schemeClr>
+        </a:solidFill>
+        <a:round/>
+      </a:ln>
+    </cs:spPr>
+    <cs:defRPr sz="1197" kern="1200"/>
+  </cs:dataTable>
+  <cs:downBar>
+    <cs:lnRef idx="0"/>
+    <cs:fillRef idx="0"/>
+    <cs:effectRef idx="0"/>
+    <cs:fontRef idx="minor">
+      <a:schemeClr val="dk1"/>
+    </cs:fontRef>
+    <cs:spPr>
+      <a:solidFill>
+        <a:schemeClr val="dk1">
+          <a:lumMod val="65000"/>
+          <a:lumOff val="35000"/>
+        </a:schemeClr>
+      </a:solidFill>
+      <a:ln w="9525">
+        <a:solidFill>
+          <a:schemeClr val="tx1">
+            <a:lumMod val="65000"/>
+            <a:lumOff val="35000"/>
+          </a:schemeClr>
+        </a:solidFill>
+      </a:ln>
+    </cs:spPr>
+  </cs:downBar>
+  <cs:dropLine>
+    <cs:lnRef idx="0"/>
+    <cs:fillRef idx="0"/>
+    <cs:effectRef idx="0"/>
+    <cs:fontRef idx="minor">
+      <a:schemeClr val="tx1"/>
+    </cs:fontRef>
+    <cs:spPr>
+      <a:ln w="9525" cap="flat" cmpd="sng" algn="ctr">
+        <a:solidFill>
+          <a:schemeClr val="tx1">
+            <a:lumMod val="35000"/>
+            <a:lumOff val="65000"/>
+          </a:schemeClr>
+        </a:solidFill>
+        <a:round/>
+      </a:ln>
+    </cs:spPr>
+  </cs:dropLine>
+  <cs:errorBar>
+    <cs:lnRef idx="0"/>
+    <cs:fillRef idx="0"/>
+    <cs:effectRef idx="0"/>
+    <cs:fontRef idx="minor">
+      <a:schemeClr val="tx1"/>
+    </cs:fontRef>
+    <cs:spPr>
+      <a:ln w="9525" cap="flat" cmpd="sng" algn="ctr">
+        <a:solidFill>
+          <a:schemeClr val="tx1">
+            <a:lumMod val="65000"/>
+            <a:lumOff val="35000"/>
+          </a:schemeClr>
+        </a:solidFill>
+        <a:round/>
+      </a:ln>
+    </cs:spPr>
+  </cs:errorBar>
+  <cs:floor>
+    <cs:lnRef idx="0"/>
+    <cs:fillRef idx="0"/>
+    <cs:effectRef idx="0"/>
+    <cs:fontRef idx="minor">
+      <a:schemeClr val="tx1"/>
+    </cs:fontRef>
+    <cs:spPr>
+      <a:noFill/>
+      <a:ln>
+        <a:noFill/>
+      </a:ln>
+    </cs:spPr>
+  </cs:floor>
+  <cs:gridlineMajor>
+    <cs:lnRef idx="0"/>
+    <cs:fillRef idx="0"/>
+    <cs:effectRef idx="0"/>
+    <cs:fontRef idx="minor">
+      <a:schemeClr val="tx1"/>
+    </cs:fontRef>
+    <cs:spPr>
+      <a:ln w="9525" cap="flat" cmpd="sng" algn="ctr">
+        <a:solidFill>
+          <a:schemeClr val="tx1">
+            <a:lumMod val="15000"/>
+            <a:lumOff val="85000"/>
+          </a:schemeClr>
+        </a:solidFill>
+        <a:round/>
+      </a:ln>
+    </cs:spPr>
+  </cs:gridlineMajor>
+  <cs:gridlineMinor>
+    <cs:lnRef idx="0"/>
+    <cs:fillRef idx="0"/>
+    <cs:effectRef idx="0"/>
+    <cs:fontRef idx="minor">
+      <a:schemeClr val="tx1"/>
+    </cs:fontRef>
+    <cs:spPr>
+      <a:ln w="9525" cap="flat" cmpd="sng" algn="ctr">
+        <a:solidFill>
+          <a:schemeClr val="tx1">
+            <a:lumMod val="5000"/>
+            <a:lumOff val="95000"/>
+          </a:schemeClr>
+        </a:solidFill>
+        <a:round/>
+      </a:ln>
+    </cs:spPr>
+  </cs:gridlineMinor>
+  <cs:hiLoLine>
+    <cs:lnRef idx="0"/>
+    <cs:fillRef idx="0"/>
+    <cs:effectRef idx="0"/>
+    <cs:fontRef idx="minor">
+      <a:schemeClr val="tx1"/>
+    </cs:fontRef>
+    <cs:spPr>
+      <a:ln w="9525" cap="flat" cmpd="sng" algn="ctr">
+        <a:solidFill>
+          <a:schemeClr val="tx1">
+            <a:lumMod val="75000"/>
+            <a:lumOff val="25000"/>
+          </a:schemeClr>
+        </a:solidFill>
+        <a:round/>
+      </a:ln>
+    </cs:spPr>
+  </cs:hiLoLine>
+  <cs:leaderLine>
+    <cs:lnRef idx="0"/>
+    <cs:fillRef idx="0"/>
+    <cs:effectRef idx="0"/>
+    <cs:fontRef idx="minor">
+      <a:schemeClr val="tx1"/>
+    </cs:fontRef>
+    <cs:spPr>
+      <a:ln w="9525" cap="flat" cmpd="sng" algn="ctr">
+        <a:solidFill>
+          <a:schemeClr val="tx1">
+            <a:lumMod val="35000"/>
+            <a:lumOff val="65000"/>
+          </a:schemeClr>
+        </a:solidFill>
+        <a:round/>
+      </a:ln>
+    </cs:spPr>
+  </cs:leaderLine>
+  <cs:legend>
+    <cs:lnRef idx="0"/>
+    <cs:fillRef idx="0"/>
+    <cs:effectRef idx="0"/>
+    <cs:fontRef idx="minor">
+      <a:schemeClr val="tx1">
+        <a:lumMod val="65000"/>
+        <a:lumOff val="35000"/>
+      </a:schemeClr>
+    </cs:fontRef>
+    <cs:defRPr sz="1197" kern="1200"/>
+  </cs:legend>
+  <cs:plotArea mods="allowNoFillOverride allowNoLineOverride">
+    <cs:lnRef idx="0"/>
+    <cs:fillRef idx="0"/>
+    <cs:effectRef idx="0"/>
+    <cs:fontRef idx="minor">
+      <a:schemeClr val="tx1"/>
+    </cs:fontRef>
+  </cs:plotArea>
+  <cs:plotArea3D mods="allowNoFillOverride allowNoLineOverride">
+    <cs:lnRef idx="0"/>
+    <cs:fillRef idx="0"/>
+    <cs:effectRef idx="0"/>
+    <cs:fontRef idx="minor">
+      <a:schemeClr val="tx1"/>
+    </cs:fontRef>
+  </cs:plotArea3D>
+  <cs:seriesAxis>
+    <cs:lnRef idx="0"/>
+    <cs:fillRef idx="0"/>
+    <cs:effectRef idx="0"/>
+    <cs:fontRef idx="minor">
+      <a:schemeClr val="tx1">
+        <a:lumMod val="65000"/>
+        <a:lumOff val="35000"/>
+      </a:schemeClr>
+    </cs:fontRef>
+    <cs:defRPr sz="1197" kern="1200"/>
+  </cs:seriesAxis>
+  <cs:seriesLine>
+    <cs:lnRef idx="0"/>
+    <cs:fillRef idx="0"/>
+    <cs:effectRef idx="0"/>
+    <cs:fontRef idx="minor">
+      <a:schemeClr val="tx1"/>
+    </cs:fontRef>
+    <cs:spPr>
+      <a:ln w="9525" cap="flat" cmpd="sng" algn="ctr">
+        <a:solidFill>
+          <a:schemeClr val="tx1">
+            <a:lumMod val="35000"/>
+            <a:lumOff val="65000"/>
+          </a:schemeClr>
+        </a:solidFill>
+        <a:round/>
+      </a:ln>
+    </cs:spPr>
+  </cs:seriesLine>
+  <cs:title>
+    <cs:lnRef idx="0"/>
+    <cs:fillRef idx="0"/>
+    <cs:effectRef idx="0"/>
+    <cs:fontRef idx="minor">
+      <a:schemeClr val="tx1">
+        <a:lumMod val="65000"/>
+        <a:lumOff val="35000"/>
+      </a:schemeClr>
+    </cs:fontRef>
+    <cs:defRPr sz="1862" b="0" kern="1200" spc="0" baseline="0"/>
+  </cs:title>
+  <cs:trendline>
+    <cs:lnRef idx="0">
+      <cs:styleClr val="auto"/>
+    </cs:lnRef>
+    <cs:fillRef idx="0"/>
+    <cs:effectRef idx="0"/>
+    <cs:fontRef idx="minor">
+      <a:schemeClr val="tx1"/>
+    </cs:fontRef>
+    <cs:spPr>
+      <a:ln w="19050" cap="rnd">
+        <a:solidFill>
+          <a:schemeClr val="phClr"/>
+        </a:solidFill>
+        <a:prstDash val="sysDot"/>
+      </a:ln>
+    </cs:spPr>
+  </cs:trendline>
+  <cs:trendlineLabel>
+    <cs:lnRef idx="0"/>
+    <cs:fillRef idx="0"/>
+    <cs:effectRef idx="0"/>
+    <cs:fontRef idx="minor">
+      <a:schemeClr val="tx1">
+        <a:lumMod val="65000"/>
+        <a:lumOff val="35000"/>
+      </a:schemeClr>
+    </cs:fontRef>
+    <cs:defRPr sz="1197" kern="1200"/>
+  </cs:trendlineLabel>
+  <cs:upBar>
+    <cs:lnRef idx="0"/>
+    <cs:fillRef idx="0"/>
+    <cs:effectRef idx="0"/>
+    <cs:fontRef idx="minor">
+      <a:schemeClr val="dk1"/>
+    </cs:fontRef>
+    <cs:spPr>
+      <a:solidFill>
+        <a:schemeClr val="lt1"/>
+      </a:solidFill>
+      <a:ln w="9525">
+        <a:solidFill>
+          <a:schemeClr val="tx1">
+            <a:lumMod val="15000"/>
+            <a:lumOff val="85000"/>
+          </a:schemeClr>
+        </a:solidFill>
+      </a:ln>
+    </cs:spPr>
+  </cs:upBar>
+  <cs:valueAxis>
+    <cs:lnRef idx="0"/>
+    <cs:fillRef idx="0"/>
+    <cs:effectRef idx="0"/>
+    <cs:fontRef idx="minor">
+      <a:schemeClr val="tx1">
+        <a:lumMod val="65000"/>
+        <a:lumOff val="35000"/>
+      </a:schemeClr>
+    </cs:fontRef>
+    <cs:defRPr sz="1197" kern="1200"/>
+  </cs:valueAxis>
+  <cs:wall>
+    <cs:lnRef idx="0"/>
+    <cs:fillRef idx="0"/>
+    <cs:effectRef idx="0"/>
+    <cs:fontRef idx="minor">
+      <a:schemeClr val="tx1"/>
+    </cs:fontRef>
+    <cs:spPr>
+      <a:noFill/>
+      <a:ln>
+        <a:noFill/>
+      </a:ln>
+    </cs:spPr>
+  </cs:wall>
+</cs:chartStyle>
+</file>
+
 <file path=ppt/slideLayouts/slideLayout1.xml><?xml version="1.0" encoding="utf-8"?>
 <p:sldLayout xmlns:a="http://schemas.openxmlformats.org/drawingml/2006/main" xmlns:r="http://schemas.openxmlformats.org/officeDocument/2006/relationships" xmlns:p="http://schemas.openxmlformats.org/presentationml/2006/main" type="title" preserve="1">
   <p:cSld name="Title Slide">
@@ -272,7 +1302,7 @@
           <a:p>
             <a:fld id="{65B58316-C8D8-4CE9-AFEB-B8C5AC9CD66E}" type="datetimeFigureOut">
               <a:rPr lang="en-US" smtClean="0"/>
-              <a:t>4/19/2018</a:t>
+              <a:t>4/20/2018</a:t>
             </a:fld>
             <a:endParaRPr lang="en-US"/>
           </a:p>
@@ -442,7 +1472,7 @@
           <a:p>
             <a:fld id="{65B58316-C8D8-4CE9-AFEB-B8C5AC9CD66E}" type="datetimeFigureOut">
               <a:rPr lang="en-US" smtClean="0"/>
-              <a:t>4/19/2018</a:t>
+              <a:t>4/20/2018</a:t>
             </a:fld>
             <a:endParaRPr lang="en-US"/>
           </a:p>
@@ -622,7 +1652,7 @@
           <a:p>
             <a:fld id="{65B58316-C8D8-4CE9-AFEB-B8C5AC9CD66E}" type="datetimeFigureOut">
               <a:rPr lang="en-US" smtClean="0"/>
-              <a:t>4/19/2018</a:t>
+              <a:t>4/20/2018</a:t>
             </a:fld>
             <a:endParaRPr lang="en-US"/>
           </a:p>
@@ -792,7 +1822,7 @@
           <a:p>
             <a:fld id="{65B58316-C8D8-4CE9-AFEB-B8C5AC9CD66E}" type="datetimeFigureOut">
               <a:rPr lang="en-US" smtClean="0"/>
-              <a:t>4/19/2018</a:t>
+              <a:t>4/20/2018</a:t>
             </a:fld>
             <a:endParaRPr lang="en-US"/>
           </a:p>
@@ -1038,7 +2068,7 @@
           <a:p>
             <a:fld id="{65B58316-C8D8-4CE9-AFEB-B8C5AC9CD66E}" type="datetimeFigureOut">
               <a:rPr lang="en-US" smtClean="0"/>
-              <a:t>4/19/2018</a:t>
+              <a:t>4/20/2018</a:t>
             </a:fld>
             <a:endParaRPr lang="en-US"/>
           </a:p>
@@ -1270,7 +2300,7 @@
           <a:p>
             <a:fld id="{65B58316-C8D8-4CE9-AFEB-B8C5AC9CD66E}" type="datetimeFigureOut">
               <a:rPr lang="en-US" smtClean="0"/>
-              <a:t>4/19/2018</a:t>
+              <a:t>4/20/2018</a:t>
             </a:fld>
             <a:endParaRPr lang="en-US"/>
           </a:p>
@@ -1637,7 +2667,7 @@
           <a:p>
             <a:fld id="{65B58316-C8D8-4CE9-AFEB-B8C5AC9CD66E}" type="datetimeFigureOut">
               <a:rPr lang="en-US" smtClean="0"/>
-              <a:t>4/19/2018</a:t>
+              <a:t>4/20/2018</a:t>
             </a:fld>
             <a:endParaRPr lang="en-US"/>
           </a:p>
@@ -1755,7 +2785,7 @@
           <a:p>
             <a:fld id="{65B58316-C8D8-4CE9-AFEB-B8C5AC9CD66E}" type="datetimeFigureOut">
               <a:rPr lang="en-US" smtClean="0"/>
-              <a:t>4/19/2018</a:t>
+              <a:t>4/20/2018</a:t>
             </a:fld>
             <a:endParaRPr lang="en-US"/>
           </a:p>
@@ -1850,7 +2880,7 @@
           <a:p>
             <a:fld id="{65B58316-C8D8-4CE9-AFEB-B8C5AC9CD66E}" type="datetimeFigureOut">
               <a:rPr lang="en-US" smtClean="0"/>
-              <a:t>4/19/2018</a:t>
+              <a:t>4/20/2018</a:t>
             </a:fld>
             <a:endParaRPr lang="en-US"/>
           </a:p>
@@ -2127,7 +3157,7 @@
           <a:p>
             <a:fld id="{65B58316-C8D8-4CE9-AFEB-B8C5AC9CD66E}" type="datetimeFigureOut">
               <a:rPr lang="en-US" smtClean="0"/>
-              <a:t>4/19/2018</a:t>
+              <a:t>4/20/2018</a:t>
             </a:fld>
             <a:endParaRPr lang="en-US"/>
           </a:p>
@@ -2384,7 +3414,7 @@
           <a:p>
             <a:fld id="{65B58316-C8D8-4CE9-AFEB-B8C5AC9CD66E}" type="datetimeFigureOut">
               <a:rPr lang="en-US" smtClean="0"/>
-              <a:t>4/19/2018</a:t>
+              <a:t>4/20/2018</a:t>
             </a:fld>
             <a:endParaRPr lang="en-US"/>
           </a:p>
@@ -2597,7 +3627,7 @@
           <a:p>
             <a:fld id="{65B58316-C8D8-4CE9-AFEB-B8C5AC9CD66E}" type="datetimeFigureOut">
               <a:rPr lang="en-US" smtClean="0"/>
-              <a:t>4/19/2018</a:t>
+              <a:t>4/20/2018</a:t>
             </a:fld>
             <a:endParaRPr lang="en-US"/>
           </a:p>
@@ -2988,6 +4018,14 @@
 <file path=ppt/slides/slide1.xml><?xml version="1.0" encoding="utf-8"?>
 <p:sld xmlns:a="http://schemas.openxmlformats.org/drawingml/2006/main" xmlns:r="http://schemas.openxmlformats.org/officeDocument/2006/relationships" xmlns:p="http://schemas.openxmlformats.org/presentationml/2006/main">
   <p:cSld>
+    <p:bg>
+      <p:bgPr>
+        <a:solidFill>
+          <a:schemeClr val="bg1"/>
+        </a:solidFill>
+        <a:effectLst/>
+      </p:bgPr>
+    </p:bg>
     <p:spTree>
       <p:nvGrpSpPr>
         <p:cNvPr id="1" name=""/>
@@ -3164,67 +4202,7 @@
                 </a:solidFill>
                 <a:latin typeface="BentonSans Regular" panose="02000503000000020004" pitchFamily="50" charset="0"/>
               </a:rPr>
-              <a:t>Detection of Hand Gestures – With Applications to American Sign Language Alphabet Recognition</a:t>
-            </a:r>
-          </a:p>
-        </p:txBody>
-      </p:sp>
-      <p:sp>
-        <p:nvSpPr>
-          <p:cNvPr id="16" name="Rectangle 15">
-            <a:extLst>
-              <a:ext uri="{FF2B5EF4-FFF2-40B4-BE49-F238E27FC236}">
-                <a16:creationId xmlns:a16="http://schemas.microsoft.com/office/drawing/2014/main" id="{5B665B0B-FA4B-4A88-9A78-2EAAC7A99B75}"/>
-              </a:ext>
-            </a:extLst>
-          </p:cNvPr>
-          <p:cNvSpPr/>
-          <p:nvPr/>
-        </p:nvSpPr>
-        <p:spPr>
-          <a:xfrm>
-            <a:off x="914401" y="6619848"/>
-            <a:ext cx="9144000" cy="816427"/>
-          </a:xfrm>
-          <a:prstGeom prst="rect">
-            <a:avLst/>
-          </a:prstGeom>
-          <a:solidFill>
-            <a:srgbClr val="A80532"/>
-          </a:solidFill>
-          <a:ln>
-            <a:noFill/>
-          </a:ln>
-        </p:spPr>
-        <p:style>
-          <a:lnRef idx="2">
-            <a:schemeClr val="accent1">
-              <a:shade val="50000"/>
-            </a:schemeClr>
-          </a:lnRef>
-          <a:fillRef idx="1">
-            <a:schemeClr val="accent1"/>
-          </a:fillRef>
-          <a:effectRef idx="0">
-            <a:schemeClr val="accent1"/>
-          </a:effectRef>
-          <a:fontRef idx="minor">
-            <a:schemeClr val="lt1"/>
-          </a:fontRef>
-        </p:style>
-        <p:txBody>
-          <a:bodyPr rtlCol="0" anchor="ctr"/>
-          <a:lstStyle/>
-          <a:p>
-            <a:pPr algn="ctr"/>
-            <a:r>
-              <a:rPr lang="en-US" sz="6000" dirty="0">
-                <a:solidFill>
-                  <a:srgbClr val="FFFFFF"/>
-                </a:solidFill>
-                <a:latin typeface="BentonSans Regular" panose="02000503000000020004" pitchFamily="50" charset="0"/>
-              </a:rPr>
-              <a:t>Introduction</a:t>
+              <a:t>Real Time Detection of Hand Gestures – With Applications to American Sign Language Alphabet Recognition</a:t>
             </a:r>
           </a:p>
         </p:txBody>
@@ -3277,16 +4255,21 @@
           <a:lstStyle/>
           <a:p>
             <a:pPr algn="ctr"/>
-            <a:endParaRPr lang="en-US" dirty="0"/>
-          </a:p>
-        </p:txBody>
-      </p:sp>
-      <p:sp>
-        <p:nvSpPr>
-          <p:cNvPr id="18" name="Rectangle 17">
+            <a:r>
+              <a:rPr lang="en-US" sz="4400" dirty="0">
+                <a:latin typeface="BentonSans Regular" panose="02000503000000020004" pitchFamily="50" charset="0"/>
+              </a:rPr>
+              <a:t>Methods</a:t>
+            </a:r>
+          </a:p>
+        </p:txBody>
+      </p:sp>
+      <p:sp>
+        <p:nvSpPr>
+          <p:cNvPr id="24" name="Rectangle: Single Corner Snipped 23">
             <a:extLst>
               <a:ext uri="{FF2B5EF4-FFF2-40B4-BE49-F238E27FC236}">
-                <a16:creationId xmlns:a16="http://schemas.microsoft.com/office/drawing/2014/main" id="{2953C84E-DAD3-4D6F-836D-8E6587CD2E47}"/>
+                <a16:creationId xmlns:a16="http://schemas.microsoft.com/office/drawing/2014/main" id="{92E2B668-8787-4613-900D-09EE7A97FEC4}"/>
               </a:ext>
             </a:extLst>
           </p:cNvPr>
@@ -3294,61 +4277,9 @@
           <p:nvPr/>
         </p:nvSpPr>
         <p:spPr>
-          <a:xfrm>
-            <a:off x="22892655" y="6619848"/>
-            <a:ext cx="9111344" cy="816427"/>
-          </a:xfrm>
-          <a:prstGeom prst="rect">
-            <a:avLst/>
-          </a:prstGeom>
-          <a:solidFill>
-            <a:srgbClr val="A80532"/>
-          </a:solidFill>
-          <a:ln>
-            <a:noFill/>
-          </a:ln>
-        </p:spPr>
-        <p:style>
-          <a:lnRef idx="2">
-            <a:schemeClr val="accent1">
-              <a:shade val="50000"/>
-            </a:schemeClr>
-          </a:lnRef>
-          <a:fillRef idx="1">
-            <a:schemeClr val="accent1"/>
-          </a:fillRef>
-          <a:effectRef idx="0">
-            <a:schemeClr val="accent1"/>
-          </a:effectRef>
-          <a:fontRef idx="minor">
-            <a:schemeClr val="lt1"/>
-          </a:fontRef>
-        </p:style>
-        <p:txBody>
-          <a:bodyPr rtlCol="0" anchor="ctr"/>
-          <a:lstStyle/>
-          <a:p>
-            <a:pPr algn="ctr"/>
-            <a:endParaRPr lang="en-US" dirty="0"/>
-          </a:p>
-        </p:txBody>
-      </p:sp>
-      <p:sp>
-        <p:nvSpPr>
-          <p:cNvPr id="20" name="Rectangle: Single Corner Snipped 19">
-            <a:extLst>
-              <a:ext uri="{FF2B5EF4-FFF2-40B4-BE49-F238E27FC236}">
-                <a16:creationId xmlns:a16="http://schemas.microsoft.com/office/drawing/2014/main" id="{FFC5FFE5-73B4-49CD-B051-09065F07B911}"/>
-              </a:ext>
-            </a:extLst>
-          </p:cNvPr>
-          <p:cNvSpPr/>
-          <p:nvPr/>
-        </p:nvSpPr>
-        <p:spPr>
           <a:xfrm flipV="1">
-            <a:off x="914401" y="6619848"/>
-            <a:ext cx="9111344" cy="5124450"/>
+            <a:off x="11005455" y="6652476"/>
+            <a:ext cx="10940141" cy="14398510"/>
           </a:xfrm>
           <a:prstGeom prst="snip1Rect">
             <a:avLst/>
@@ -3385,147 +4316,189 @@
           </a:p>
         </p:txBody>
       </p:sp>
-      <p:sp>
-        <p:nvSpPr>
-          <p:cNvPr id="23" name="Rectangle: Single Corner Snipped 22">
+      <p:grpSp>
+        <p:nvGrpSpPr>
+          <p:cNvPr id="2" name="Group 1">
             <a:extLst>
               <a:ext uri="{FF2B5EF4-FFF2-40B4-BE49-F238E27FC236}">
-                <a16:creationId xmlns:a16="http://schemas.microsoft.com/office/drawing/2014/main" id="{B5493DCB-CF50-401B-8CA3-95BC072E090B}"/>
+                <a16:creationId xmlns:a16="http://schemas.microsoft.com/office/drawing/2014/main" id="{E834C63C-FF9F-4EB7-9EB8-3338535D3B69}"/>
               </a:ext>
             </a:extLst>
           </p:cNvPr>
-          <p:cNvSpPr/>
+          <p:cNvGrpSpPr/>
           <p:nvPr/>
-        </p:nvSpPr>
-        <p:spPr>
-          <a:xfrm flipV="1">
-            <a:off x="22892655" y="6662003"/>
-            <a:ext cx="9111344" cy="5124450"/>
+        </p:nvGrpSpPr>
+        <p:grpSpPr>
+          <a:xfrm>
+            <a:off x="914401" y="11580360"/>
+            <a:ext cx="9144000" cy="5884498"/>
+            <a:chOff x="914401" y="15176014"/>
+            <a:chExt cx="9144000" cy="5884498"/>
           </a:xfrm>
-          <a:prstGeom prst="snip1Rect">
-            <a:avLst/>
-          </a:prstGeom>
-          <a:noFill/>
-          <a:ln w="57150">
+        </p:grpSpPr>
+        <p:sp>
+          <p:nvSpPr>
+            <p:cNvPr id="16" name="Rectangle 15">
+              <a:extLst>
+                <a:ext uri="{FF2B5EF4-FFF2-40B4-BE49-F238E27FC236}">
+                  <a16:creationId xmlns:a16="http://schemas.microsoft.com/office/drawing/2014/main" id="{5B665B0B-FA4B-4A88-9A78-2EAAC7A99B75}"/>
+                </a:ext>
+              </a:extLst>
+            </p:cNvPr>
+            <p:cNvSpPr/>
+            <p:nvPr/>
+          </p:nvSpPr>
+          <p:spPr>
+            <a:xfrm>
+              <a:off x="914401" y="15176014"/>
+              <a:ext cx="9144000" cy="774273"/>
+            </a:xfrm>
+            <a:prstGeom prst="rect">
+              <a:avLst/>
+            </a:prstGeom>
             <a:solidFill>
               <a:srgbClr val="A80532"/>
             </a:solidFill>
-          </a:ln>
-        </p:spPr>
-        <p:style>
-          <a:lnRef idx="2">
-            <a:schemeClr val="accent1">
-              <a:shade val="50000"/>
-            </a:schemeClr>
-          </a:lnRef>
-          <a:fillRef idx="1">
-            <a:schemeClr val="accent1"/>
-          </a:fillRef>
-          <a:effectRef idx="0">
-            <a:schemeClr val="accent1"/>
-          </a:effectRef>
-          <a:fontRef idx="minor">
-            <a:schemeClr val="lt1"/>
-          </a:fontRef>
-        </p:style>
-        <p:txBody>
-          <a:bodyPr rtlCol="0" anchor="ctr"/>
-          <a:lstStyle/>
-          <a:p>
-            <a:pPr algn="ctr"/>
-            <a:endParaRPr lang="en-US"/>
-          </a:p>
-        </p:txBody>
-      </p:sp>
-      <p:sp>
-        <p:nvSpPr>
-          <p:cNvPr id="24" name="Rectangle: Single Corner Snipped 23">
-            <a:extLst>
-              <a:ext uri="{FF2B5EF4-FFF2-40B4-BE49-F238E27FC236}">
-                <a16:creationId xmlns:a16="http://schemas.microsoft.com/office/drawing/2014/main" id="{92E2B668-8787-4613-900D-09EE7A97FEC4}"/>
-              </a:ext>
-            </a:extLst>
-          </p:cNvPr>
-          <p:cNvSpPr/>
-          <p:nvPr/>
-        </p:nvSpPr>
-        <p:spPr>
-          <a:xfrm flipV="1">
-            <a:off x="11005455" y="6662003"/>
-            <a:ext cx="10940141" cy="5124450"/>
-          </a:xfrm>
-          <a:prstGeom prst="snip1Rect">
-            <a:avLst/>
-          </a:prstGeom>
-          <a:noFill/>
-          <a:ln w="57150">
-            <a:solidFill>
-              <a:srgbClr val="A80532"/>
-            </a:solidFill>
-          </a:ln>
-        </p:spPr>
-        <p:style>
-          <a:lnRef idx="2">
-            <a:schemeClr val="accent1">
-              <a:shade val="50000"/>
-            </a:schemeClr>
-          </a:lnRef>
-          <a:fillRef idx="1">
-            <a:schemeClr val="accent1"/>
-          </a:fillRef>
-          <a:effectRef idx="0">
-            <a:schemeClr val="accent1"/>
-          </a:effectRef>
-          <a:fontRef idx="minor">
-            <a:schemeClr val="lt1"/>
-          </a:fontRef>
-        </p:style>
-        <p:txBody>
-          <a:bodyPr rtlCol="0" anchor="ctr"/>
-          <a:lstStyle/>
-          <a:p>
-            <a:pPr algn="ctr"/>
-            <a:endParaRPr lang="en-US"/>
-          </a:p>
-        </p:txBody>
-      </p:sp>
-      <p:sp>
-        <p:nvSpPr>
-          <p:cNvPr id="25" name="TextBox 24">
-            <a:extLst>
-              <a:ext uri="{FF2B5EF4-FFF2-40B4-BE49-F238E27FC236}">
-                <a16:creationId xmlns:a16="http://schemas.microsoft.com/office/drawing/2014/main" id="{7C7578A9-5AED-425B-B179-A6E798EEF0F3}"/>
-              </a:ext>
-            </a:extLst>
-          </p:cNvPr>
-          <p:cNvSpPr txBox="1"/>
-          <p:nvPr/>
-        </p:nvSpPr>
-        <p:spPr>
-          <a:xfrm>
-            <a:off x="1208315" y="8516744"/>
-            <a:ext cx="4838056" cy="646331"/>
-          </a:xfrm>
-          <a:prstGeom prst="rect">
-            <a:avLst/>
-          </a:prstGeom>
-          <a:noFill/>
-        </p:spPr>
-        <p:txBody>
-          <a:bodyPr wrap="none" rtlCol="0">
-            <a:spAutoFit/>
-          </a:bodyPr>
-          <a:lstStyle/>
-          <a:p>
-            <a:r>
-              <a:rPr lang="en-US" sz="3600" dirty="0">
+            <a:ln>
+              <a:noFill/>
+            </a:ln>
+          </p:spPr>
+          <p:style>
+            <a:lnRef idx="2">
+              <a:schemeClr val="accent1">
+                <a:shade val="50000"/>
+              </a:schemeClr>
+            </a:lnRef>
+            <a:fillRef idx="1">
+              <a:schemeClr val="accent1"/>
+            </a:fillRef>
+            <a:effectRef idx="0">
+              <a:schemeClr val="accent1"/>
+            </a:effectRef>
+            <a:fontRef idx="minor">
+              <a:schemeClr val="lt1"/>
+            </a:fontRef>
+          </p:style>
+          <p:txBody>
+            <a:bodyPr rtlCol="0" anchor="ctr"/>
+            <a:lstStyle/>
+            <a:p>
+              <a:pPr algn="ctr"/>
+              <a:r>
+                <a:rPr lang="en-US" sz="4400" dirty="0">
+                  <a:solidFill>
+                    <a:srgbClr val="FFFFFF"/>
+                  </a:solidFill>
+                  <a:latin typeface="BentonSans Regular" panose="02000503000000020004" pitchFamily="50" charset="0"/>
+                </a:rPr>
+                <a:t>Introduction</a:t>
+              </a:r>
+            </a:p>
+          </p:txBody>
+        </p:sp>
+        <p:sp>
+          <p:nvSpPr>
+            <p:cNvPr id="20" name="Rectangle: Single Corner Snipped 19">
+              <a:extLst>
+                <a:ext uri="{FF2B5EF4-FFF2-40B4-BE49-F238E27FC236}">
+                  <a16:creationId xmlns:a16="http://schemas.microsoft.com/office/drawing/2014/main" id="{FFC5FFE5-73B4-49CD-B051-09065F07B911}"/>
+                </a:ext>
+              </a:extLst>
+            </p:cNvPr>
+            <p:cNvSpPr/>
+            <p:nvPr/>
+          </p:nvSpPr>
+          <p:spPr>
+            <a:xfrm flipV="1">
+              <a:off x="914401" y="15176014"/>
+              <a:ext cx="9111344" cy="5884498"/>
+            </a:xfrm>
+            <a:prstGeom prst="snip1Rect">
+              <a:avLst/>
+            </a:prstGeom>
+            <a:noFill/>
+            <a:ln w="57150">
+              <a:solidFill>
+                <a:srgbClr val="A80532"/>
+              </a:solidFill>
+            </a:ln>
+          </p:spPr>
+          <p:style>
+            <a:lnRef idx="2">
+              <a:schemeClr val="accent1">
+                <a:shade val="50000"/>
+              </a:schemeClr>
+            </a:lnRef>
+            <a:fillRef idx="1">
+              <a:schemeClr val="accent1"/>
+            </a:fillRef>
+            <a:effectRef idx="0">
+              <a:schemeClr val="accent1"/>
+            </a:effectRef>
+            <a:fontRef idx="minor">
+              <a:schemeClr val="lt1"/>
+            </a:fontRef>
+          </p:style>
+          <p:txBody>
+            <a:bodyPr rtlCol="0" anchor="ctr"/>
+            <a:lstStyle/>
+            <a:p>
+              <a:pPr algn="ctr"/>
+              <a:endParaRPr lang="en-US"/>
+            </a:p>
+          </p:txBody>
+        </p:sp>
+        <p:sp>
+          <p:nvSpPr>
+            <p:cNvPr id="25" name="TextBox 24">
+              <a:extLst>
+                <a:ext uri="{FF2B5EF4-FFF2-40B4-BE49-F238E27FC236}">
+                  <a16:creationId xmlns:a16="http://schemas.microsoft.com/office/drawing/2014/main" id="{7C7578A9-5AED-425B-B179-A6E798EEF0F3}"/>
+                </a:ext>
+              </a:extLst>
+            </p:cNvPr>
+            <p:cNvSpPr txBox="1"/>
+            <p:nvPr/>
+          </p:nvSpPr>
+          <p:spPr>
+            <a:xfrm rot="10800000" flipV="1">
+              <a:off x="1208312" y="16276519"/>
+              <a:ext cx="8345065" cy="4524315"/>
+            </a:xfrm>
+            <a:prstGeom prst="rect">
+              <a:avLst/>
+            </a:prstGeom>
+            <a:noFill/>
+          </p:spPr>
+          <p:txBody>
+            <a:bodyPr wrap="square" rtlCol="0">
+              <a:spAutoFit/>
+            </a:bodyPr>
+            <a:lstStyle/>
+            <a:p>
+              <a:r>
+                <a:rPr lang="en-US" sz="2400" dirty="0">
+                  <a:latin typeface="BentonSans Regular" panose="02000503000000020004" pitchFamily="50" charset="0"/>
+                </a:rPr>
+                <a:t>As the power of machine learning techniques continues to grow, the number of interfaces between machine and man continue to grow. For example, assistants such as Alexa and Cortana have popularized a natural speech based interface with computers.</a:t>
+              </a:r>
+            </a:p>
+            <a:p>
+              <a:endParaRPr lang="en-US" sz="2400" dirty="0">
                 <a:latin typeface="BentonSans Regular" panose="02000503000000020004" pitchFamily="50" charset="0"/>
-              </a:rPr>
-              <a:t>Talk about our project</a:t>
-            </a:r>
-          </a:p>
-        </p:txBody>
-      </p:sp>
+              </a:endParaRPr>
+            </a:p>
+            <a:p>
+              <a:r>
+                <a:rPr lang="en-US" sz="2400" dirty="0">
+                  <a:latin typeface="BentonSans Regular" panose="02000503000000020004" pitchFamily="50" charset="0"/>
+                </a:rPr>
+                <a:t>Our goal with this project is to prototype a gesture based interface with computers, with the goal of being able to recognize a predefined set of hand based gestures from a live video feed. To this end, we present an application for recognizing American Sign Language alphabetical hand gestures.</a:t>
+              </a:r>
+            </a:p>
+          </p:txBody>
+        </p:sp>
+      </p:grpSp>
       <p:pic>
         <p:nvPicPr>
           <p:cNvPr id="3" name="Picture 2" descr="A close up of text on a white background&#10;&#10;Description generated with high confidence">
@@ -3554,14 +4527,1778 @@
         </p:blipFill>
         <p:spPr>
           <a:xfrm>
-            <a:off x="1208315" y="13171036"/>
-            <a:ext cx="8345065" cy="4658375"/>
+            <a:off x="11794393" y="7817642"/>
+            <a:ext cx="4664807" cy="2603984"/>
           </a:xfrm>
           <a:prstGeom prst="rect">
             <a:avLst/>
           </a:prstGeom>
         </p:spPr>
       </p:pic>
+      <p:grpSp>
+        <p:nvGrpSpPr>
+          <p:cNvPr id="19" name="Group 18">
+            <a:extLst>
+              <a:ext uri="{FF2B5EF4-FFF2-40B4-BE49-F238E27FC236}">
+                <a16:creationId xmlns:a16="http://schemas.microsoft.com/office/drawing/2014/main" id="{70710633-02B5-4B1B-A0DB-ECE7239E6490}"/>
+              </a:ext>
+            </a:extLst>
+          </p:cNvPr>
+          <p:cNvGrpSpPr/>
+          <p:nvPr/>
+        </p:nvGrpSpPr>
+        <p:grpSpPr>
+          <a:xfrm>
+            <a:off x="914401" y="6662003"/>
+            <a:ext cx="9144000" cy="4310797"/>
+            <a:chOff x="914401" y="15176014"/>
+            <a:chExt cx="9144000" cy="4310797"/>
+          </a:xfrm>
+        </p:grpSpPr>
+        <p:sp>
+          <p:nvSpPr>
+            <p:cNvPr id="21" name="Rectangle 20">
+              <a:extLst>
+                <a:ext uri="{FF2B5EF4-FFF2-40B4-BE49-F238E27FC236}">
+                  <a16:creationId xmlns:a16="http://schemas.microsoft.com/office/drawing/2014/main" id="{0559E423-02AD-49DE-B176-21EADF60DA30}"/>
+                </a:ext>
+              </a:extLst>
+            </p:cNvPr>
+            <p:cNvSpPr/>
+            <p:nvPr/>
+          </p:nvSpPr>
+          <p:spPr>
+            <a:xfrm>
+              <a:off x="914401" y="15176015"/>
+              <a:ext cx="9144000" cy="774272"/>
+            </a:xfrm>
+            <a:prstGeom prst="rect">
+              <a:avLst/>
+            </a:prstGeom>
+            <a:solidFill>
+              <a:srgbClr val="A80532"/>
+            </a:solidFill>
+            <a:ln>
+              <a:noFill/>
+            </a:ln>
+          </p:spPr>
+          <p:style>
+            <a:lnRef idx="2">
+              <a:schemeClr val="accent1">
+                <a:shade val="50000"/>
+              </a:schemeClr>
+            </a:lnRef>
+            <a:fillRef idx="1">
+              <a:schemeClr val="accent1"/>
+            </a:fillRef>
+            <a:effectRef idx="0">
+              <a:schemeClr val="accent1"/>
+            </a:effectRef>
+            <a:fontRef idx="minor">
+              <a:schemeClr val="lt1"/>
+            </a:fontRef>
+          </p:style>
+          <p:txBody>
+            <a:bodyPr rtlCol="0" anchor="ctr"/>
+            <a:lstStyle/>
+            <a:p>
+              <a:pPr algn="ctr"/>
+              <a:r>
+                <a:rPr lang="en-US" sz="4400" dirty="0">
+                  <a:solidFill>
+                    <a:srgbClr val="FFFFFF"/>
+                  </a:solidFill>
+                  <a:latin typeface="BentonSans Regular" panose="02000503000000020004" pitchFamily="50" charset="0"/>
+                </a:rPr>
+                <a:t>Abstract</a:t>
+              </a:r>
+            </a:p>
+          </p:txBody>
+        </p:sp>
+        <p:sp>
+          <p:nvSpPr>
+            <p:cNvPr id="22" name="Rectangle: Single Corner Snipped 21">
+              <a:extLst>
+                <a:ext uri="{FF2B5EF4-FFF2-40B4-BE49-F238E27FC236}">
+                  <a16:creationId xmlns:a16="http://schemas.microsoft.com/office/drawing/2014/main" id="{945CC53A-7E18-40A9-B580-59D51067FA4D}"/>
+                </a:ext>
+              </a:extLst>
+            </p:cNvPr>
+            <p:cNvSpPr/>
+            <p:nvPr/>
+          </p:nvSpPr>
+          <p:spPr>
+            <a:xfrm flipV="1">
+              <a:off x="914401" y="15176014"/>
+              <a:ext cx="9111344" cy="4310797"/>
+            </a:xfrm>
+            <a:prstGeom prst="snip1Rect">
+              <a:avLst/>
+            </a:prstGeom>
+            <a:noFill/>
+            <a:ln w="57150">
+              <a:solidFill>
+                <a:srgbClr val="A80532"/>
+              </a:solidFill>
+            </a:ln>
+          </p:spPr>
+          <p:style>
+            <a:lnRef idx="2">
+              <a:schemeClr val="accent1">
+                <a:shade val="50000"/>
+              </a:schemeClr>
+            </a:lnRef>
+            <a:fillRef idx="1">
+              <a:schemeClr val="accent1"/>
+            </a:fillRef>
+            <a:effectRef idx="0">
+              <a:schemeClr val="accent1"/>
+            </a:effectRef>
+            <a:fontRef idx="minor">
+              <a:schemeClr val="lt1"/>
+            </a:fontRef>
+          </p:style>
+          <p:txBody>
+            <a:bodyPr rtlCol="0" anchor="ctr"/>
+            <a:lstStyle/>
+            <a:p>
+              <a:pPr algn="ctr"/>
+              <a:endParaRPr lang="en-US"/>
+            </a:p>
+          </p:txBody>
+        </p:sp>
+        <p:sp>
+          <p:nvSpPr>
+            <p:cNvPr id="26" name="TextBox 25">
+              <a:extLst>
+                <a:ext uri="{FF2B5EF4-FFF2-40B4-BE49-F238E27FC236}">
+                  <a16:creationId xmlns:a16="http://schemas.microsoft.com/office/drawing/2014/main" id="{AF08D979-E5C9-4FD5-86C6-3307904257E2}"/>
+                </a:ext>
+              </a:extLst>
+            </p:cNvPr>
+            <p:cNvSpPr txBox="1"/>
+            <p:nvPr/>
+          </p:nvSpPr>
+          <p:spPr>
+            <a:xfrm rot="10800000" flipV="1">
+              <a:off x="1208313" y="16399411"/>
+              <a:ext cx="8345065" cy="2677656"/>
+            </a:xfrm>
+            <a:prstGeom prst="rect">
+              <a:avLst/>
+            </a:prstGeom>
+            <a:noFill/>
+          </p:spPr>
+          <p:txBody>
+            <a:bodyPr wrap="square" rtlCol="0">
+              <a:spAutoFit/>
+            </a:bodyPr>
+            <a:lstStyle/>
+            <a:p>
+              <a:r>
+                <a:rPr lang="en-US" sz="2400" dirty="0">
+                  <a:latin typeface="BentonSans Regular" panose="02000503000000020004" pitchFamily="50" charset="0"/>
+                </a:rPr>
+                <a:t>We present a method for super real-time classification of American Sign Language alphabetical gestures. We employ a two phase image recognition pipeline, wherein hands are localized within the original input image,  extracted, and fed into a CNN based classifier which outputs the detected letter. Our results indicate that our method achieves X% accuracy in a real-world scenario.</a:t>
+              </a:r>
+            </a:p>
+          </p:txBody>
+        </p:sp>
+      </p:grpSp>
+      <p:grpSp>
+        <p:nvGrpSpPr>
+          <p:cNvPr id="27" name="Group 26">
+            <a:extLst>
+              <a:ext uri="{FF2B5EF4-FFF2-40B4-BE49-F238E27FC236}">
+                <a16:creationId xmlns:a16="http://schemas.microsoft.com/office/drawing/2014/main" id="{4C3C758B-9021-4307-A6F6-916CB72E04BC}"/>
+              </a:ext>
+            </a:extLst>
+          </p:cNvPr>
+          <p:cNvGrpSpPr/>
+          <p:nvPr/>
+        </p:nvGrpSpPr>
+        <p:grpSpPr>
+          <a:xfrm>
+            <a:off x="910320" y="18170388"/>
+            <a:ext cx="9144000" cy="2898282"/>
+            <a:chOff x="914401" y="15176014"/>
+            <a:chExt cx="9144000" cy="2898282"/>
+          </a:xfrm>
+        </p:grpSpPr>
+        <p:sp>
+          <p:nvSpPr>
+            <p:cNvPr id="28" name="Rectangle 27">
+              <a:extLst>
+                <a:ext uri="{FF2B5EF4-FFF2-40B4-BE49-F238E27FC236}">
+                  <a16:creationId xmlns:a16="http://schemas.microsoft.com/office/drawing/2014/main" id="{79CA956B-9D3D-402C-855B-0EAC3BE66013}"/>
+                </a:ext>
+              </a:extLst>
+            </p:cNvPr>
+            <p:cNvSpPr/>
+            <p:nvPr/>
+          </p:nvSpPr>
+          <p:spPr>
+            <a:xfrm>
+              <a:off x="914401" y="15176015"/>
+              <a:ext cx="9144000" cy="774272"/>
+            </a:xfrm>
+            <a:prstGeom prst="rect">
+              <a:avLst/>
+            </a:prstGeom>
+            <a:solidFill>
+              <a:srgbClr val="A80532"/>
+            </a:solidFill>
+            <a:ln>
+              <a:noFill/>
+            </a:ln>
+          </p:spPr>
+          <p:style>
+            <a:lnRef idx="2">
+              <a:schemeClr val="accent1">
+                <a:shade val="50000"/>
+              </a:schemeClr>
+            </a:lnRef>
+            <a:fillRef idx="1">
+              <a:schemeClr val="accent1"/>
+            </a:fillRef>
+            <a:effectRef idx="0">
+              <a:schemeClr val="accent1"/>
+            </a:effectRef>
+            <a:fontRef idx="minor">
+              <a:schemeClr val="lt1"/>
+            </a:fontRef>
+          </p:style>
+          <p:txBody>
+            <a:bodyPr rtlCol="0" anchor="ctr"/>
+            <a:lstStyle/>
+            <a:p>
+              <a:pPr algn="ctr"/>
+              <a:r>
+                <a:rPr lang="en-US" sz="4400" dirty="0">
+                  <a:solidFill>
+                    <a:srgbClr val="FFFFFF"/>
+                  </a:solidFill>
+                  <a:latin typeface="BentonSans Regular" panose="02000503000000020004" pitchFamily="50" charset="0"/>
+                </a:rPr>
+                <a:t>Background and Related Work</a:t>
+              </a:r>
+            </a:p>
+          </p:txBody>
+        </p:sp>
+        <p:sp>
+          <p:nvSpPr>
+            <p:cNvPr id="29" name="Rectangle: Single Corner Snipped 28">
+              <a:extLst>
+                <a:ext uri="{FF2B5EF4-FFF2-40B4-BE49-F238E27FC236}">
+                  <a16:creationId xmlns:a16="http://schemas.microsoft.com/office/drawing/2014/main" id="{01BA3EF9-187B-4C2D-B3DD-D22CC5B9A668}"/>
+                </a:ext>
+              </a:extLst>
+            </p:cNvPr>
+            <p:cNvSpPr/>
+            <p:nvPr/>
+          </p:nvSpPr>
+          <p:spPr>
+            <a:xfrm flipV="1">
+              <a:off x="914401" y="15176014"/>
+              <a:ext cx="9111344" cy="2898282"/>
+            </a:xfrm>
+            <a:prstGeom prst="snip1Rect">
+              <a:avLst/>
+            </a:prstGeom>
+            <a:noFill/>
+            <a:ln w="57150">
+              <a:solidFill>
+                <a:srgbClr val="A80532"/>
+              </a:solidFill>
+            </a:ln>
+          </p:spPr>
+          <p:style>
+            <a:lnRef idx="2">
+              <a:schemeClr val="accent1">
+                <a:shade val="50000"/>
+              </a:schemeClr>
+            </a:lnRef>
+            <a:fillRef idx="1">
+              <a:schemeClr val="accent1"/>
+            </a:fillRef>
+            <a:effectRef idx="0">
+              <a:schemeClr val="accent1"/>
+            </a:effectRef>
+            <a:fontRef idx="minor">
+              <a:schemeClr val="lt1"/>
+            </a:fontRef>
+          </p:style>
+          <p:txBody>
+            <a:bodyPr rtlCol="0" anchor="ctr"/>
+            <a:lstStyle/>
+            <a:p>
+              <a:pPr algn="ctr"/>
+              <a:endParaRPr lang="en-US"/>
+            </a:p>
+          </p:txBody>
+        </p:sp>
+        <p:sp>
+          <p:nvSpPr>
+            <p:cNvPr id="30" name="TextBox 29">
+              <a:extLst>
+                <a:ext uri="{FF2B5EF4-FFF2-40B4-BE49-F238E27FC236}">
+                  <a16:creationId xmlns:a16="http://schemas.microsoft.com/office/drawing/2014/main" id="{A8A84AE8-8A47-47B7-B981-137F4E48BFB1}"/>
+                </a:ext>
+              </a:extLst>
+            </p:cNvPr>
+            <p:cNvSpPr txBox="1"/>
+            <p:nvPr/>
+          </p:nvSpPr>
+          <p:spPr>
+            <a:xfrm rot="10800000" flipV="1">
+              <a:off x="1212393" y="16057320"/>
+              <a:ext cx="8345065" cy="1938992"/>
+            </a:xfrm>
+            <a:prstGeom prst="rect">
+              <a:avLst/>
+            </a:prstGeom>
+            <a:noFill/>
+          </p:spPr>
+          <p:txBody>
+            <a:bodyPr wrap="square" rtlCol="0">
+              <a:spAutoFit/>
+            </a:bodyPr>
+            <a:lstStyle/>
+            <a:p>
+              <a:r>
+                <a:rPr lang="en-US" sz="2400" dirty="0">
+                  <a:latin typeface="BentonSans Regular" panose="02000503000000020004" pitchFamily="50" charset="0"/>
+                </a:rPr>
+                <a:t>Hand localization has been tackled before in the VIVA hand detection challenge.</a:t>
+              </a:r>
+            </a:p>
+            <a:p>
+              <a:r>
+                <a:rPr lang="en-US" sz="2400" dirty="0">
+                  <a:latin typeface="BentonSans Regular" panose="02000503000000020004" pitchFamily="50" charset="0"/>
+                </a:rPr>
+                <a:t>Sign language letter classification has been approached in a public Kaggle competition titled </a:t>
+              </a:r>
+              <a:r>
+                <a:rPr lang="en-US" sz="2400" b="1" i="1" dirty="0">
+                  <a:latin typeface="BentonSans Regular" panose="02000503000000020004" pitchFamily="50" charset="0"/>
+                </a:rPr>
+                <a:t>Sign Language MNIST</a:t>
+              </a:r>
+              <a:endParaRPr lang="en-US" sz="2400" dirty="0">
+                <a:latin typeface="BentonSans Regular" panose="02000503000000020004" pitchFamily="50" charset="0"/>
+              </a:endParaRPr>
+            </a:p>
+          </p:txBody>
+        </p:sp>
+      </p:grpSp>
+      <p:grpSp>
+        <p:nvGrpSpPr>
+          <p:cNvPr id="31" name="Group 30">
+            <a:extLst>
+              <a:ext uri="{FF2B5EF4-FFF2-40B4-BE49-F238E27FC236}">
+                <a16:creationId xmlns:a16="http://schemas.microsoft.com/office/drawing/2014/main" id="{D376441E-E17A-4E93-BB15-9EB12A4B2C0C}"/>
+              </a:ext>
+            </a:extLst>
+          </p:cNvPr>
+          <p:cNvGrpSpPr/>
+          <p:nvPr/>
+        </p:nvGrpSpPr>
+        <p:grpSpPr>
+          <a:xfrm>
+            <a:off x="22859999" y="6668778"/>
+            <a:ext cx="9144000" cy="4310797"/>
+            <a:chOff x="914401" y="15176014"/>
+            <a:chExt cx="9144000" cy="4310797"/>
+          </a:xfrm>
+        </p:grpSpPr>
+        <p:sp>
+          <p:nvSpPr>
+            <p:cNvPr id="32" name="Rectangle 31">
+              <a:extLst>
+                <a:ext uri="{FF2B5EF4-FFF2-40B4-BE49-F238E27FC236}">
+                  <a16:creationId xmlns:a16="http://schemas.microsoft.com/office/drawing/2014/main" id="{A378D491-5E82-4F1E-B428-4646A4341122}"/>
+                </a:ext>
+              </a:extLst>
+            </p:cNvPr>
+            <p:cNvSpPr/>
+            <p:nvPr/>
+          </p:nvSpPr>
+          <p:spPr>
+            <a:xfrm>
+              <a:off x="914401" y="15176015"/>
+              <a:ext cx="9144000" cy="774272"/>
+            </a:xfrm>
+            <a:prstGeom prst="rect">
+              <a:avLst/>
+            </a:prstGeom>
+            <a:solidFill>
+              <a:srgbClr val="A80532"/>
+            </a:solidFill>
+            <a:ln>
+              <a:noFill/>
+            </a:ln>
+          </p:spPr>
+          <p:style>
+            <a:lnRef idx="2">
+              <a:schemeClr val="accent1">
+                <a:shade val="50000"/>
+              </a:schemeClr>
+            </a:lnRef>
+            <a:fillRef idx="1">
+              <a:schemeClr val="accent1"/>
+            </a:fillRef>
+            <a:effectRef idx="0">
+              <a:schemeClr val="accent1"/>
+            </a:effectRef>
+            <a:fontRef idx="minor">
+              <a:schemeClr val="lt1"/>
+            </a:fontRef>
+          </p:style>
+          <p:txBody>
+            <a:bodyPr rtlCol="0" anchor="ctr"/>
+            <a:lstStyle/>
+            <a:p>
+              <a:pPr algn="ctr"/>
+              <a:r>
+                <a:rPr lang="en-US" sz="4400" dirty="0">
+                  <a:solidFill>
+                    <a:srgbClr val="FFFFFF"/>
+                  </a:solidFill>
+                  <a:latin typeface="BentonSans Regular" panose="02000503000000020004" pitchFamily="50" charset="0"/>
+                </a:rPr>
+                <a:t>Data</a:t>
+              </a:r>
+            </a:p>
+          </p:txBody>
+        </p:sp>
+        <p:sp>
+          <p:nvSpPr>
+            <p:cNvPr id="33" name="Rectangle: Single Corner Snipped 32">
+              <a:extLst>
+                <a:ext uri="{FF2B5EF4-FFF2-40B4-BE49-F238E27FC236}">
+                  <a16:creationId xmlns:a16="http://schemas.microsoft.com/office/drawing/2014/main" id="{1666E1AB-512D-488D-B30B-A7B5DEC59F2C}"/>
+                </a:ext>
+              </a:extLst>
+            </p:cNvPr>
+            <p:cNvSpPr/>
+            <p:nvPr/>
+          </p:nvSpPr>
+          <p:spPr>
+            <a:xfrm flipV="1">
+              <a:off x="914401" y="15176014"/>
+              <a:ext cx="9111344" cy="4310797"/>
+            </a:xfrm>
+            <a:prstGeom prst="snip1Rect">
+              <a:avLst/>
+            </a:prstGeom>
+            <a:noFill/>
+            <a:ln w="57150">
+              <a:solidFill>
+                <a:srgbClr val="A80532"/>
+              </a:solidFill>
+            </a:ln>
+          </p:spPr>
+          <p:style>
+            <a:lnRef idx="2">
+              <a:schemeClr val="accent1">
+                <a:shade val="50000"/>
+              </a:schemeClr>
+            </a:lnRef>
+            <a:fillRef idx="1">
+              <a:schemeClr val="accent1"/>
+            </a:fillRef>
+            <a:effectRef idx="0">
+              <a:schemeClr val="accent1"/>
+            </a:effectRef>
+            <a:fontRef idx="minor">
+              <a:schemeClr val="lt1"/>
+            </a:fontRef>
+          </p:style>
+          <p:txBody>
+            <a:bodyPr rtlCol="0" anchor="ctr"/>
+            <a:lstStyle/>
+            <a:p>
+              <a:pPr algn="ctr"/>
+              <a:endParaRPr lang="en-US"/>
+            </a:p>
+          </p:txBody>
+        </p:sp>
+        <p:sp>
+          <p:nvSpPr>
+            <p:cNvPr id="34" name="TextBox 33">
+              <a:extLst>
+                <a:ext uri="{FF2B5EF4-FFF2-40B4-BE49-F238E27FC236}">
+                  <a16:creationId xmlns:a16="http://schemas.microsoft.com/office/drawing/2014/main" id="{71393462-3E1C-4A9D-A5F8-AC0DC7C56E35}"/>
+                </a:ext>
+              </a:extLst>
+            </p:cNvPr>
+            <p:cNvSpPr txBox="1"/>
+            <p:nvPr/>
+          </p:nvSpPr>
+          <p:spPr>
+            <a:xfrm rot="10800000" flipV="1">
+              <a:off x="1447800" y="18418529"/>
+              <a:ext cx="6953251" cy="830997"/>
+            </a:xfrm>
+            <a:prstGeom prst="rect">
+              <a:avLst/>
+            </a:prstGeom>
+            <a:noFill/>
+          </p:spPr>
+          <p:txBody>
+            <a:bodyPr wrap="square" rtlCol="0">
+              <a:spAutoFit/>
+            </a:bodyPr>
+            <a:lstStyle/>
+            <a:p>
+              <a:r>
+                <a:rPr lang="en-US" sz="2400" dirty="0">
+                  <a:latin typeface="BentonSans Regular" panose="02000503000000020004" pitchFamily="50" charset="0"/>
+                </a:rPr>
+                <a:t>Samples from the localization and classification </a:t>
+              </a:r>
+              <a:r>
+                <a:rPr lang="en-US" sz="2400" dirty="0" err="1">
+                  <a:latin typeface="BentonSans Regular" panose="02000503000000020004" pitchFamily="50" charset="0"/>
+                </a:rPr>
+                <a:t>datsets</a:t>
+              </a:r>
+              <a:r>
+                <a:rPr lang="en-US" sz="2400" dirty="0">
+                  <a:latin typeface="BentonSans Regular" panose="02000503000000020004" pitchFamily="50" charset="0"/>
+                </a:rPr>
+                <a:t>.</a:t>
+              </a:r>
+            </a:p>
+          </p:txBody>
+        </p:sp>
+      </p:grpSp>
+      <p:grpSp>
+        <p:nvGrpSpPr>
+          <p:cNvPr id="35" name="Group 34">
+            <a:extLst>
+              <a:ext uri="{FF2B5EF4-FFF2-40B4-BE49-F238E27FC236}">
+                <a16:creationId xmlns:a16="http://schemas.microsoft.com/office/drawing/2014/main" id="{E9C83586-F444-4401-85A2-7C51B5A57088}"/>
+              </a:ext>
+            </a:extLst>
+          </p:cNvPr>
+          <p:cNvGrpSpPr/>
+          <p:nvPr/>
+        </p:nvGrpSpPr>
+        <p:grpSpPr>
+          <a:xfrm>
+            <a:off x="22859999" y="11625266"/>
+            <a:ext cx="9144000" cy="4310797"/>
+            <a:chOff x="914401" y="15176014"/>
+            <a:chExt cx="9144000" cy="4310797"/>
+          </a:xfrm>
+        </p:grpSpPr>
+        <p:sp>
+          <p:nvSpPr>
+            <p:cNvPr id="36" name="Rectangle 35">
+              <a:extLst>
+                <a:ext uri="{FF2B5EF4-FFF2-40B4-BE49-F238E27FC236}">
+                  <a16:creationId xmlns:a16="http://schemas.microsoft.com/office/drawing/2014/main" id="{DB59CAC2-40DB-40F1-AF76-8E0066BA56B4}"/>
+                </a:ext>
+              </a:extLst>
+            </p:cNvPr>
+            <p:cNvSpPr/>
+            <p:nvPr/>
+          </p:nvSpPr>
+          <p:spPr>
+            <a:xfrm>
+              <a:off x="914401" y="15176015"/>
+              <a:ext cx="9144000" cy="774272"/>
+            </a:xfrm>
+            <a:prstGeom prst="rect">
+              <a:avLst/>
+            </a:prstGeom>
+            <a:solidFill>
+              <a:srgbClr val="A80532"/>
+            </a:solidFill>
+            <a:ln>
+              <a:noFill/>
+            </a:ln>
+          </p:spPr>
+          <p:style>
+            <a:lnRef idx="2">
+              <a:schemeClr val="accent1">
+                <a:shade val="50000"/>
+              </a:schemeClr>
+            </a:lnRef>
+            <a:fillRef idx="1">
+              <a:schemeClr val="accent1"/>
+            </a:fillRef>
+            <a:effectRef idx="0">
+              <a:schemeClr val="accent1"/>
+            </a:effectRef>
+            <a:fontRef idx="minor">
+              <a:schemeClr val="lt1"/>
+            </a:fontRef>
+          </p:style>
+          <p:txBody>
+            <a:bodyPr rtlCol="0" anchor="ctr"/>
+            <a:lstStyle/>
+            <a:p>
+              <a:pPr algn="ctr"/>
+              <a:r>
+                <a:rPr lang="en-US" sz="4400" dirty="0">
+                  <a:solidFill>
+                    <a:srgbClr val="FFFFFF"/>
+                  </a:solidFill>
+                  <a:latin typeface="BentonSans Regular" panose="02000503000000020004" pitchFamily="50" charset="0"/>
+                </a:rPr>
+                <a:t>Results</a:t>
+              </a:r>
+            </a:p>
+          </p:txBody>
+        </p:sp>
+        <p:sp>
+          <p:nvSpPr>
+            <p:cNvPr id="37" name="Rectangle: Single Corner Snipped 36">
+              <a:extLst>
+                <a:ext uri="{FF2B5EF4-FFF2-40B4-BE49-F238E27FC236}">
+                  <a16:creationId xmlns:a16="http://schemas.microsoft.com/office/drawing/2014/main" id="{02FBD4E5-9466-4B8C-AEF5-CEE6E394A5F5}"/>
+                </a:ext>
+              </a:extLst>
+            </p:cNvPr>
+            <p:cNvSpPr/>
+            <p:nvPr/>
+          </p:nvSpPr>
+          <p:spPr>
+            <a:xfrm flipV="1">
+              <a:off x="914401" y="15176014"/>
+              <a:ext cx="9111344" cy="4310797"/>
+            </a:xfrm>
+            <a:prstGeom prst="snip1Rect">
+              <a:avLst/>
+            </a:prstGeom>
+            <a:noFill/>
+            <a:ln w="57150">
+              <a:solidFill>
+                <a:srgbClr val="A80532"/>
+              </a:solidFill>
+            </a:ln>
+          </p:spPr>
+          <p:style>
+            <a:lnRef idx="2">
+              <a:schemeClr val="accent1">
+                <a:shade val="50000"/>
+              </a:schemeClr>
+            </a:lnRef>
+            <a:fillRef idx="1">
+              <a:schemeClr val="accent1"/>
+            </a:fillRef>
+            <a:effectRef idx="0">
+              <a:schemeClr val="accent1"/>
+            </a:effectRef>
+            <a:fontRef idx="minor">
+              <a:schemeClr val="lt1"/>
+            </a:fontRef>
+          </p:style>
+          <p:txBody>
+            <a:bodyPr rtlCol="0" anchor="ctr"/>
+            <a:lstStyle/>
+            <a:p>
+              <a:pPr algn="ctr"/>
+              <a:endParaRPr lang="en-US"/>
+            </a:p>
+          </p:txBody>
+        </p:sp>
+        <p:sp>
+          <p:nvSpPr>
+            <p:cNvPr id="38" name="TextBox 37">
+              <a:extLst>
+                <a:ext uri="{FF2B5EF4-FFF2-40B4-BE49-F238E27FC236}">
+                  <a16:creationId xmlns:a16="http://schemas.microsoft.com/office/drawing/2014/main" id="{DA00F785-CAF8-4124-AA6F-287F4FDB3014}"/>
+                </a:ext>
+              </a:extLst>
+            </p:cNvPr>
+            <p:cNvSpPr txBox="1"/>
+            <p:nvPr/>
+          </p:nvSpPr>
+          <p:spPr>
+            <a:xfrm rot="10800000" flipV="1">
+              <a:off x="1113399" y="16074668"/>
+              <a:ext cx="8345065" cy="1200329"/>
+            </a:xfrm>
+            <a:prstGeom prst="rect">
+              <a:avLst/>
+            </a:prstGeom>
+            <a:noFill/>
+          </p:spPr>
+          <p:txBody>
+            <a:bodyPr wrap="square" rtlCol="0">
+              <a:spAutoFit/>
+            </a:bodyPr>
+            <a:lstStyle/>
+            <a:p>
+              <a:r>
+                <a:rPr lang="en-US" sz="2400" dirty="0">
+                  <a:latin typeface="BentonSans Regular" panose="02000503000000020004" pitchFamily="50" charset="0"/>
+                </a:rPr>
+                <a:t>There can be no doubt that our results were stellar. Here’s a handy graph of our results. (That is to say, we are still working on them.)</a:t>
+              </a:r>
+            </a:p>
+          </p:txBody>
+        </p:sp>
+      </p:grpSp>
+      <p:grpSp>
+        <p:nvGrpSpPr>
+          <p:cNvPr id="39" name="Group 38">
+            <a:extLst>
+              <a:ext uri="{FF2B5EF4-FFF2-40B4-BE49-F238E27FC236}">
+                <a16:creationId xmlns:a16="http://schemas.microsoft.com/office/drawing/2014/main" id="{91BD9D70-8736-4FAA-A54A-7A00EE861B7D}"/>
+              </a:ext>
+            </a:extLst>
+          </p:cNvPr>
+          <p:cNvGrpSpPr/>
+          <p:nvPr/>
+        </p:nvGrpSpPr>
+        <p:grpSpPr>
+          <a:xfrm>
+            <a:off x="22859999" y="16711630"/>
+            <a:ext cx="9144000" cy="4310797"/>
+            <a:chOff x="914401" y="15176014"/>
+            <a:chExt cx="9144000" cy="4310797"/>
+          </a:xfrm>
+        </p:grpSpPr>
+        <p:sp>
+          <p:nvSpPr>
+            <p:cNvPr id="40" name="Rectangle 39">
+              <a:extLst>
+                <a:ext uri="{FF2B5EF4-FFF2-40B4-BE49-F238E27FC236}">
+                  <a16:creationId xmlns:a16="http://schemas.microsoft.com/office/drawing/2014/main" id="{BCEE865F-0EFE-4867-9787-E1D9577FD303}"/>
+                </a:ext>
+              </a:extLst>
+            </p:cNvPr>
+            <p:cNvSpPr/>
+            <p:nvPr/>
+          </p:nvSpPr>
+          <p:spPr>
+            <a:xfrm>
+              <a:off x="914401" y="15176015"/>
+              <a:ext cx="9144000" cy="774272"/>
+            </a:xfrm>
+            <a:prstGeom prst="rect">
+              <a:avLst/>
+            </a:prstGeom>
+            <a:solidFill>
+              <a:srgbClr val="A80532"/>
+            </a:solidFill>
+            <a:ln>
+              <a:noFill/>
+            </a:ln>
+          </p:spPr>
+          <p:style>
+            <a:lnRef idx="2">
+              <a:schemeClr val="accent1">
+                <a:shade val="50000"/>
+              </a:schemeClr>
+            </a:lnRef>
+            <a:fillRef idx="1">
+              <a:schemeClr val="accent1"/>
+            </a:fillRef>
+            <a:effectRef idx="0">
+              <a:schemeClr val="accent1"/>
+            </a:effectRef>
+            <a:fontRef idx="minor">
+              <a:schemeClr val="lt1"/>
+            </a:fontRef>
+          </p:style>
+          <p:txBody>
+            <a:bodyPr rtlCol="0" anchor="ctr"/>
+            <a:lstStyle/>
+            <a:p>
+              <a:pPr algn="ctr"/>
+              <a:r>
+                <a:rPr lang="en-US" sz="4400" dirty="0">
+                  <a:solidFill>
+                    <a:srgbClr val="FFFFFF"/>
+                  </a:solidFill>
+                  <a:latin typeface="BentonSans Regular" panose="02000503000000020004" pitchFamily="50" charset="0"/>
+                </a:rPr>
+                <a:t>Conclusion</a:t>
+              </a:r>
+            </a:p>
+          </p:txBody>
+        </p:sp>
+        <p:sp>
+          <p:nvSpPr>
+            <p:cNvPr id="41" name="Rectangle: Single Corner Snipped 40">
+              <a:extLst>
+                <a:ext uri="{FF2B5EF4-FFF2-40B4-BE49-F238E27FC236}">
+                  <a16:creationId xmlns:a16="http://schemas.microsoft.com/office/drawing/2014/main" id="{D193B636-FF7A-43F7-880D-D564B89F72CF}"/>
+                </a:ext>
+              </a:extLst>
+            </p:cNvPr>
+            <p:cNvSpPr/>
+            <p:nvPr/>
+          </p:nvSpPr>
+          <p:spPr>
+            <a:xfrm flipV="1">
+              <a:off x="914401" y="15176014"/>
+              <a:ext cx="9111344" cy="4310797"/>
+            </a:xfrm>
+            <a:prstGeom prst="snip1Rect">
+              <a:avLst/>
+            </a:prstGeom>
+            <a:noFill/>
+            <a:ln w="57150">
+              <a:solidFill>
+                <a:srgbClr val="A80532"/>
+              </a:solidFill>
+            </a:ln>
+          </p:spPr>
+          <p:style>
+            <a:lnRef idx="2">
+              <a:schemeClr val="accent1">
+                <a:shade val="50000"/>
+              </a:schemeClr>
+            </a:lnRef>
+            <a:fillRef idx="1">
+              <a:schemeClr val="accent1"/>
+            </a:fillRef>
+            <a:effectRef idx="0">
+              <a:schemeClr val="accent1"/>
+            </a:effectRef>
+            <a:fontRef idx="minor">
+              <a:schemeClr val="lt1"/>
+            </a:fontRef>
+          </p:style>
+          <p:txBody>
+            <a:bodyPr rtlCol="0" anchor="ctr"/>
+            <a:lstStyle/>
+            <a:p>
+              <a:pPr algn="ctr"/>
+              <a:endParaRPr lang="en-US"/>
+            </a:p>
+          </p:txBody>
+        </p:sp>
+        <p:sp>
+          <p:nvSpPr>
+            <p:cNvPr id="42" name="TextBox 41">
+              <a:extLst>
+                <a:ext uri="{FF2B5EF4-FFF2-40B4-BE49-F238E27FC236}">
+                  <a16:creationId xmlns:a16="http://schemas.microsoft.com/office/drawing/2014/main" id="{D658996B-413A-4AEB-9716-B2F645600BFF}"/>
+                </a:ext>
+              </a:extLst>
+            </p:cNvPr>
+            <p:cNvSpPr txBox="1"/>
+            <p:nvPr/>
+          </p:nvSpPr>
+          <p:spPr>
+            <a:xfrm rot="10800000" flipV="1">
+              <a:off x="1208313" y="16953409"/>
+              <a:ext cx="8345065" cy="1569660"/>
+            </a:xfrm>
+            <a:prstGeom prst="rect">
+              <a:avLst/>
+            </a:prstGeom>
+            <a:noFill/>
+          </p:spPr>
+          <p:txBody>
+            <a:bodyPr wrap="square" rtlCol="0">
+              <a:spAutoFit/>
+            </a:bodyPr>
+            <a:lstStyle/>
+            <a:p>
+              <a:r>
+                <a:rPr lang="en-US" sz="2400" dirty="0">
+                  <a:latin typeface="BentonSans Regular" panose="02000503000000020004" pitchFamily="50" charset="0"/>
+                </a:rPr>
+                <a:t>The results clearly demonstrate the superiority of our method compared to other methods for this topic. QED</a:t>
+              </a:r>
+            </a:p>
+            <a:p>
+              <a:endParaRPr lang="en-US" sz="2400" dirty="0">
+                <a:latin typeface="BentonSans Regular" panose="02000503000000020004" pitchFamily="50" charset="0"/>
+              </a:endParaRPr>
+            </a:p>
+            <a:p>
+              <a:r>
+                <a:rPr lang="en-US" sz="2400" dirty="0">
+                  <a:latin typeface="BentonSans Regular" panose="02000503000000020004" pitchFamily="50" charset="0"/>
+                </a:rPr>
+                <a:t>Actual </a:t>
+              </a:r>
+              <a:r>
+                <a:rPr lang="en-US" sz="2400">
+                  <a:latin typeface="BentonSans Regular" panose="02000503000000020004" pitchFamily="50" charset="0"/>
+                </a:rPr>
+                <a:t>conclusion forthcoming.</a:t>
+              </a:r>
+              <a:endParaRPr lang="en-US" sz="2400" dirty="0">
+                <a:latin typeface="BentonSans Regular" panose="02000503000000020004" pitchFamily="50" charset="0"/>
+              </a:endParaRPr>
+            </a:p>
+          </p:txBody>
+        </p:sp>
+      </p:grpSp>
+      <p:grpSp>
+        <p:nvGrpSpPr>
+          <p:cNvPr id="57" name="Group 56">
+            <a:extLst>
+              <a:ext uri="{FF2B5EF4-FFF2-40B4-BE49-F238E27FC236}">
+                <a16:creationId xmlns:a16="http://schemas.microsoft.com/office/drawing/2014/main" id="{573AC8D8-AB48-480E-90DA-C31872E6E0BF}"/>
+              </a:ext>
+            </a:extLst>
+          </p:cNvPr>
+          <p:cNvGrpSpPr/>
+          <p:nvPr/>
+        </p:nvGrpSpPr>
+        <p:grpSpPr>
+          <a:xfrm>
+            <a:off x="14387244" y="10802993"/>
+            <a:ext cx="6936654" cy="1725683"/>
+            <a:chOff x="14336628" y="11727310"/>
+            <a:chExt cx="6936654" cy="1725683"/>
+          </a:xfrm>
+        </p:grpSpPr>
+        <p:pic>
+          <p:nvPicPr>
+            <p:cNvPr id="5" name="Picture 4" descr="A picture containing wall, person, indoor, man&#10;&#10;Description generated with very high confidence">
+              <a:extLst>
+                <a:ext uri="{FF2B5EF4-FFF2-40B4-BE49-F238E27FC236}">
+                  <a16:creationId xmlns:a16="http://schemas.microsoft.com/office/drawing/2014/main" id="{91288E11-EDE7-4792-8E26-A180E06EFD80}"/>
+                </a:ext>
+              </a:extLst>
+            </p:cNvPr>
+            <p:cNvPicPr>
+              <a:picLocks noChangeAspect="1"/>
+            </p:cNvPicPr>
+            <p:nvPr/>
+          </p:nvPicPr>
+          <p:blipFill>
+            <a:blip r:embed="rId4">
+              <a:extLst>
+                <a:ext uri="{28A0092B-C50C-407E-A947-70E740481C1C}">
+                  <a14:useLocalDpi xmlns:a14="http://schemas.microsoft.com/office/drawing/2010/main" val="0"/>
+                </a:ext>
+              </a:extLst>
+            </a:blip>
+            <a:stretch>
+              <a:fillRect/>
+            </a:stretch>
+          </p:blipFill>
+          <p:spPr>
+            <a:xfrm>
+              <a:off x="14336628" y="11727310"/>
+              <a:ext cx="3067880" cy="1725683"/>
+            </a:xfrm>
+            <a:prstGeom prst="rect">
+              <a:avLst/>
+            </a:prstGeom>
+          </p:spPr>
+        </p:pic>
+        <p:sp>
+          <p:nvSpPr>
+            <p:cNvPr id="6" name="Rectangle 5">
+              <a:extLst>
+                <a:ext uri="{FF2B5EF4-FFF2-40B4-BE49-F238E27FC236}">
+                  <a16:creationId xmlns:a16="http://schemas.microsoft.com/office/drawing/2014/main" id="{C4B613A2-1BE0-41E4-B72D-11E6353B43AD}"/>
+                </a:ext>
+              </a:extLst>
+            </p:cNvPr>
+            <p:cNvSpPr/>
+            <p:nvPr/>
+          </p:nvSpPr>
+          <p:spPr>
+            <a:xfrm>
+              <a:off x="14705048" y="12178401"/>
+              <a:ext cx="565260" cy="508210"/>
+            </a:xfrm>
+            <a:prstGeom prst="rect">
+              <a:avLst/>
+            </a:prstGeom>
+            <a:noFill/>
+            <a:ln w="6350">
+              <a:solidFill>
+                <a:srgbClr val="92D050"/>
+              </a:solidFill>
+            </a:ln>
+          </p:spPr>
+          <p:style>
+            <a:lnRef idx="2">
+              <a:schemeClr val="accent1">
+                <a:shade val="50000"/>
+              </a:schemeClr>
+            </a:lnRef>
+            <a:fillRef idx="1">
+              <a:schemeClr val="accent1"/>
+            </a:fillRef>
+            <a:effectRef idx="0">
+              <a:schemeClr val="accent1"/>
+            </a:effectRef>
+            <a:fontRef idx="minor">
+              <a:schemeClr val="lt1"/>
+            </a:fontRef>
+          </p:style>
+          <p:txBody>
+            <a:bodyPr rtlCol="0" anchor="ctr"/>
+            <a:lstStyle/>
+            <a:p>
+              <a:pPr algn="ctr"/>
+              <a:endParaRPr lang="en-US"/>
+            </a:p>
+          </p:txBody>
+        </p:sp>
+        <p:cxnSp>
+          <p:nvCxnSpPr>
+            <p:cNvPr id="8" name="Straight Arrow Connector 7">
+              <a:extLst>
+                <a:ext uri="{FF2B5EF4-FFF2-40B4-BE49-F238E27FC236}">
+                  <a16:creationId xmlns:a16="http://schemas.microsoft.com/office/drawing/2014/main" id="{200E481F-0EEF-4C3D-964A-4613A0F9A8D0}"/>
+                </a:ext>
+              </a:extLst>
+            </p:cNvPr>
+            <p:cNvCxnSpPr/>
+            <p:nvPr/>
+          </p:nvCxnSpPr>
+          <p:spPr>
+            <a:xfrm>
+              <a:off x="17599024" y="12585315"/>
+              <a:ext cx="781050" cy="0"/>
+            </a:xfrm>
+            <a:prstGeom prst="straightConnector1">
+              <a:avLst/>
+            </a:prstGeom>
+            <a:ln>
+              <a:tailEnd type="triangle"/>
+            </a:ln>
+          </p:spPr>
+          <p:style>
+            <a:lnRef idx="1">
+              <a:schemeClr val="accent1"/>
+            </a:lnRef>
+            <a:fillRef idx="0">
+              <a:schemeClr val="accent1"/>
+            </a:fillRef>
+            <a:effectRef idx="0">
+              <a:schemeClr val="accent1"/>
+            </a:effectRef>
+            <a:fontRef idx="minor">
+              <a:schemeClr val="tx1"/>
+            </a:fontRef>
+          </p:style>
+        </p:cxnSp>
+        <p:pic>
+          <p:nvPicPr>
+            <p:cNvPr id="44" name="Picture 43" descr="A picture containing wall, person, indoor, man&#10;&#10;Description generated with very high confidence">
+              <a:extLst>
+                <a:ext uri="{FF2B5EF4-FFF2-40B4-BE49-F238E27FC236}">
+                  <a16:creationId xmlns:a16="http://schemas.microsoft.com/office/drawing/2014/main" id="{E115C0FB-03DF-48A5-8818-8875D045E50B}"/>
+                </a:ext>
+              </a:extLst>
+            </p:cNvPr>
+            <p:cNvPicPr>
+              <a:picLocks noChangeAspect="1"/>
+            </p:cNvPicPr>
+            <p:nvPr/>
+          </p:nvPicPr>
+          <p:blipFill rotWithShape="1">
+            <a:blip r:embed="rId4">
+              <a:extLst>
+                <a:ext uri="{28A0092B-C50C-407E-A947-70E740481C1C}">
+                  <a14:useLocalDpi xmlns:a14="http://schemas.microsoft.com/office/drawing/2010/main" val="0"/>
+                </a:ext>
+              </a:extLst>
+            </a:blip>
+            <a:srcRect l="11978" t="28106" r="69083" b="40434"/>
+            <a:stretch/>
+          </p:blipFill>
+          <p:spPr>
+            <a:xfrm>
+              <a:off x="18574590" y="12104269"/>
+              <a:ext cx="1015159" cy="948542"/>
+            </a:xfrm>
+            <a:prstGeom prst="rect">
+              <a:avLst/>
+            </a:prstGeom>
+          </p:spPr>
+        </p:pic>
+        <p:cxnSp>
+          <p:nvCxnSpPr>
+            <p:cNvPr id="45" name="Straight Arrow Connector 44">
+              <a:extLst>
+                <a:ext uri="{FF2B5EF4-FFF2-40B4-BE49-F238E27FC236}">
+                  <a16:creationId xmlns:a16="http://schemas.microsoft.com/office/drawing/2014/main" id="{4721D999-F932-477E-BEFF-E189847601E4}"/>
+                </a:ext>
+              </a:extLst>
+            </p:cNvPr>
+            <p:cNvCxnSpPr/>
+            <p:nvPr/>
+          </p:nvCxnSpPr>
+          <p:spPr>
+            <a:xfrm>
+              <a:off x="19770724" y="12585315"/>
+              <a:ext cx="781050" cy="0"/>
+            </a:xfrm>
+            <a:prstGeom prst="straightConnector1">
+              <a:avLst/>
+            </a:prstGeom>
+            <a:ln>
+              <a:tailEnd type="triangle"/>
+            </a:ln>
+          </p:spPr>
+          <p:style>
+            <a:lnRef idx="1">
+              <a:schemeClr val="accent1"/>
+            </a:lnRef>
+            <a:fillRef idx="0">
+              <a:schemeClr val="accent1"/>
+            </a:fillRef>
+            <a:effectRef idx="0">
+              <a:schemeClr val="accent1"/>
+            </a:effectRef>
+            <a:fontRef idx="minor">
+              <a:schemeClr val="tx1"/>
+            </a:fontRef>
+          </p:style>
+        </p:cxnSp>
+        <p:sp>
+          <p:nvSpPr>
+            <p:cNvPr id="9" name="TextBox 8">
+              <a:extLst>
+                <a:ext uri="{FF2B5EF4-FFF2-40B4-BE49-F238E27FC236}">
+                  <a16:creationId xmlns:a16="http://schemas.microsoft.com/office/drawing/2014/main" id="{321ED64D-99FE-4932-B956-3C1C55D92B6B}"/>
+                </a:ext>
+              </a:extLst>
+            </p:cNvPr>
+            <p:cNvSpPr txBox="1"/>
+            <p:nvPr/>
+          </p:nvSpPr>
+          <p:spPr>
+            <a:xfrm>
+              <a:off x="20732749" y="12200594"/>
+              <a:ext cx="540533" cy="769441"/>
+            </a:xfrm>
+            <a:prstGeom prst="rect">
+              <a:avLst/>
+            </a:prstGeom>
+            <a:noFill/>
+          </p:spPr>
+          <p:txBody>
+            <a:bodyPr wrap="none" rtlCol="0">
+              <a:spAutoFit/>
+            </a:bodyPr>
+            <a:lstStyle/>
+            <a:p>
+              <a:r>
+                <a:rPr lang="en-US" sz="4400" dirty="0">
+                  <a:latin typeface="BentonSans Regular" panose="02000503000000020004" pitchFamily="50" charset="0"/>
+                </a:rPr>
+                <a:t>Y</a:t>
+              </a:r>
+            </a:p>
+          </p:txBody>
+        </p:sp>
+        <p:sp>
+          <p:nvSpPr>
+            <p:cNvPr id="12" name="TextBox 11">
+              <a:extLst>
+                <a:ext uri="{FF2B5EF4-FFF2-40B4-BE49-F238E27FC236}">
+                  <a16:creationId xmlns:a16="http://schemas.microsoft.com/office/drawing/2014/main" id="{584AD31F-CDEA-4A97-AE4D-880F1548225F}"/>
+                </a:ext>
+              </a:extLst>
+            </p:cNvPr>
+            <p:cNvSpPr txBox="1"/>
+            <p:nvPr/>
+          </p:nvSpPr>
+          <p:spPr>
+            <a:xfrm>
+              <a:off x="17459415" y="12230351"/>
+              <a:ext cx="1072730" cy="246221"/>
+            </a:xfrm>
+            <a:prstGeom prst="rect">
+              <a:avLst/>
+            </a:prstGeom>
+            <a:noFill/>
+          </p:spPr>
+          <p:txBody>
+            <a:bodyPr wrap="none" rtlCol="0">
+              <a:spAutoFit/>
+            </a:bodyPr>
+            <a:lstStyle/>
+            <a:p>
+              <a:r>
+                <a:rPr lang="en-US" sz="1000" dirty="0">
+                  <a:latin typeface="BentonSans Regular" panose="02000503000000020004" pitchFamily="50" charset="0"/>
+                </a:rPr>
+                <a:t>Hand Localizer</a:t>
+              </a:r>
+            </a:p>
+          </p:txBody>
+        </p:sp>
+        <p:sp>
+          <p:nvSpPr>
+            <p:cNvPr id="46" name="Rectangle 45">
+              <a:extLst>
+                <a:ext uri="{FF2B5EF4-FFF2-40B4-BE49-F238E27FC236}">
+                  <a16:creationId xmlns:a16="http://schemas.microsoft.com/office/drawing/2014/main" id="{08FCBE8D-B407-458B-A89A-BA71E21ADF7F}"/>
+                </a:ext>
+              </a:extLst>
+            </p:cNvPr>
+            <p:cNvSpPr/>
+            <p:nvPr/>
+          </p:nvSpPr>
+          <p:spPr>
+            <a:xfrm>
+              <a:off x="19589749" y="12199670"/>
+              <a:ext cx="1244251" cy="246221"/>
+            </a:xfrm>
+            <a:prstGeom prst="rect">
+              <a:avLst/>
+            </a:prstGeom>
+          </p:spPr>
+          <p:txBody>
+            <a:bodyPr wrap="none">
+              <a:spAutoFit/>
+            </a:bodyPr>
+            <a:lstStyle/>
+            <a:p>
+              <a:r>
+                <a:rPr lang="en-US" sz="1000" dirty="0">
+                  <a:latin typeface="BentonSans Regular" panose="02000503000000020004" pitchFamily="50" charset="0"/>
+                </a:rPr>
+                <a:t>Gesture Classifier</a:t>
+              </a:r>
+            </a:p>
+          </p:txBody>
+        </p:sp>
+      </p:grpSp>
+      <p:sp>
+        <p:nvSpPr>
+          <p:cNvPr id="56" name="Rectangle 55">
+            <a:extLst>
+              <a:ext uri="{FF2B5EF4-FFF2-40B4-BE49-F238E27FC236}">
+                <a16:creationId xmlns:a16="http://schemas.microsoft.com/office/drawing/2014/main" id="{0CA4EED7-1DB0-40D0-8A37-DD820C317E3F}"/>
+              </a:ext>
+            </a:extLst>
+          </p:cNvPr>
+          <p:cNvSpPr/>
+          <p:nvPr/>
+        </p:nvSpPr>
+        <p:spPr>
+          <a:xfrm>
+            <a:off x="16560798" y="8254099"/>
+            <a:ext cx="5283200" cy="1938992"/>
+          </a:xfrm>
+          <a:prstGeom prst="rect">
+            <a:avLst/>
+          </a:prstGeom>
+        </p:spPr>
+        <p:txBody>
+          <a:bodyPr wrap="square">
+            <a:spAutoFit/>
+          </a:bodyPr>
+          <a:lstStyle/>
+          <a:p>
+            <a:r>
+              <a:rPr lang="en-US" sz="2400" dirty="0">
+                <a:latin typeface="BentonSans Regular" panose="02000503000000020004" pitchFamily="50" charset="0"/>
+              </a:rPr>
+              <a:t>Our classifier is trained on American Sign Language alphabetical gestures. Since our model cannot detect movement between frames, letters J and Z have been omitted.</a:t>
+            </a:r>
+            <a:endParaRPr lang="en-US" sz="2400" dirty="0"/>
+          </a:p>
+        </p:txBody>
+      </p:sp>
+      <p:sp>
+        <p:nvSpPr>
+          <p:cNvPr id="58" name="Rectangle 57">
+            <a:extLst>
+              <a:ext uri="{FF2B5EF4-FFF2-40B4-BE49-F238E27FC236}">
+                <a16:creationId xmlns:a16="http://schemas.microsoft.com/office/drawing/2014/main" id="{4A38ECCE-BA07-42AD-B78C-C9CB317FF5AD}"/>
+              </a:ext>
+            </a:extLst>
+          </p:cNvPr>
+          <p:cNvSpPr/>
+          <p:nvPr/>
+        </p:nvSpPr>
+        <p:spPr>
+          <a:xfrm>
+            <a:off x="11449051" y="11060832"/>
+            <a:ext cx="2550118" cy="1200329"/>
+          </a:xfrm>
+          <a:prstGeom prst="rect">
+            <a:avLst/>
+          </a:prstGeom>
+        </p:spPr>
+        <p:txBody>
+          <a:bodyPr wrap="square">
+            <a:spAutoFit/>
+          </a:bodyPr>
+          <a:lstStyle/>
+          <a:p>
+            <a:r>
+              <a:rPr lang="en-US" sz="2400" dirty="0">
+                <a:latin typeface="BentonSans Regular" panose="02000503000000020004" pitchFamily="50" charset="0"/>
+              </a:rPr>
+              <a:t>An illustration of our processing pipeline</a:t>
+            </a:r>
+            <a:endParaRPr lang="en-US" sz="2400" dirty="0"/>
+          </a:p>
+        </p:txBody>
+      </p:sp>
+      <p:sp>
+        <p:nvSpPr>
+          <p:cNvPr id="59" name="TextBox 58">
+            <a:extLst>
+              <a:ext uri="{FF2B5EF4-FFF2-40B4-BE49-F238E27FC236}">
+                <a16:creationId xmlns:a16="http://schemas.microsoft.com/office/drawing/2014/main" id="{A24ED8A5-B8E0-4B3D-B040-11BD0696A5FD}"/>
+              </a:ext>
+            </a:extLst>
+          </p:cNvPr>
+          <p:cNvSpPr txBox="1"/>
+          <p:nvPr/>
+        </p:nvSpPr>
+        <p:spPr>
+          <a:xfrm>
+            <a:off x="12793239" y="15074426"/>
+            <a:ext cx="2864630" cy="461665"/>
+          </a:xfrm>
+          <a:prstGeom prst="rect">
+            <a:avLst/>
+          </a:prstGeom>
+          <a:noFill/>
+        </p:spPr>
+        <p:txBody>
+          <a:bodyPr wrap="none" rtlCol="0">
+            <a:spAutoFit/>
+          </a:bodyPr>
+          <a:lstStyle/>
+          <a:p>
+            <a:r>
+              <a:rPr lang="en-US" sz="2400" b="1" dirty="0">
+                <a:latin typeface="BentonSans Regular" panose="02000503000000020004" pitchFamily="50" charset="0"/>
+              </a:rPr>
+              <a:t>Hand Localization</a:t>
+            </a:r>
+          </a:p>
+        </p:txBody>
+      </p:sp>
+      <p:sp>
+        <p:nvSpPr>
+          <p:cNvPr id="60" name="Rectangle 59">
+            <a:extLst>
+              <a:ext uri="{FF2B5EF4-FFF2-40B4-BE49-F238E27FC236}">
+                <a16:creationId xmlns:a16="http://schemas.microsoft.com/office/drawing/2014/main" id="{3A005A97-B1A8-4169-898F-11D2992E60A0}"/>
+              </a:ext>
+            </a:extLst>
+          </p:cNvPr>
+          <p:cNvSpPr/>
+          <p:nvPr/>
+        </p:nvSpPr>
+        <p:spPr>
+          <a:xfrm>
+            <a:off x="17484524" y="15074425"/>
+            <a:ext cx="3206840" cy="461665"/>
+          </a:xfrm>
+          <a:prstGeom prst="rect">
+            <a:avLst/>
+          </a:prstGeom>
+        </p:spPr>
+        <p:txBody>
+          <a:bodyPr wrap="none">
+            <a:spAutoFit/>
+          </a:bodyPr>
+          <a:lstStyle/>
+          <a:p>
+            <a:r>
+              <a:rPr lang="en-US" sz="2400" b="1" dirty="0">
+                <a:latin typeface="BentonSans Regular" panose="02000503000000020004" pitchFamily="50" charset="0"/>
+              </a:rPr>
+              <a:t>Letter Classification</a:t>
+            </a:r>
+          </a:p>
+        </p:txBody>
+      </p:sp>
+      <p:sp>
+        <p:nvSpPr>
+          <p:cNvPr id="62" name="Rectangle: Single Corner Snipped 61">
+            <a:extLst>
+              <a:ext uri="{FF2B5EF4-FFF2-40B4-BE49-F238E27FC236}">
+                <a16:creationId xmlns:a16="http://schemas.microsoft.com/office/drawing/2014/main" id="{471690F7-811B-4325-8568-04DF0BC74864}"/>
+              </a:ext>
+            </a:extLst>
+          </p:cNvPr>
+          <p:cNvSpPr/>
+          <p:nvPr/>
+        </p:nvSpPr>
+        <p:spPr>
+          <a:xfrm flipV="1">
+            <a:off x="16497301" y="14999374"/>
+            <a:ext cx="5044326" cy="5450825"/>
+          </a:xfrm>
+          <a:prstGeom prst="snip1Rect">
+            <a:avLst/>
+          </a:prstGeom>
+          <a:noFill/>
+          <a:ln w="57150">
+            <a:solidFill>
+              <a:srgbClr val="A80532"/>
+            </a:solidFill>
+          </a:ln>
+        </p:spPr>
+        <p:style>
+          <a:lnRef idx="2">
+            <a:schemeClr val="accent1">
+              <a:shade val="50000"/>
+            </a:schemeClr>
+          </a:lnRef>
+          <a:fillRef idx="1">
+            <a:schemeClr val="accent1"/>
+          </a:fillRef>
+          <a:effectRef idx="0">
+            <a:schemeClr val="accent1"/>
+          </a:effectRef>
+          <a:fontRef idx="minor">
+            <a:schemeClr val="lt1"/>
+          </a:fontRef>
+        </p:style>
+        <p:txBody>
+          <a:bodyPr rtlCol="0" anchor="ctr"/>
+          <a:lstStyle/>
+          <a:p>
+            <a:pPr algn="ctr"/>
+            <a:endParaRPr lang="en-US"/>
+          </a:p>
+        </p:txBody>
+      </p:sp>
+      <p:sp>
+        <p:nvSpPr>
+          <p:cNvPr id="63" name="Rectangle: Single Corner Snipped 62">
+            <a:extLst>
+              <a:ext uri="{FF2B5EF4-FFF2-40B4-BE49-F238E27FC236}">
+                <a16:creationId xmlns:a16="http://schemas.microsoft.com/office/drawing/2014/main" id="{1AFA96BC-E9F3-4FD5-9BEE-31B1D4D7C6BB}"/>
+              </a:ext>
+            </a:extLst>
+          </p:cNvPr>
+          <p:cNvSpPr/>
+          <p:nvPr/>
+        </p:nvSpPr>
+        <p:spPr>
+          <a:xfrm rot="-10800000" flipV="1">
+            <a:off x="11449051" y="14999374"/>
+            <a:ext cx="5044326" cy="5450825"/>
+          </a:xfrm>
+          <a:prstGeom prst="snip1Rect">
+            <a:avLst/>
+          </a:prstGeom>
+          <a:noFill/>
+          <a:ln w="57150">
+            <a:solidFill>
+              <a:srgbClr val="A80532"/>
+            </a:solidFill>
+          </a:ln>
+        </p:spPr>
+        <p:style>
+          <a:lnRef idx="2">
+            <a:schemeClr val="accent1">
+              <a:shade val="50000"/>
+            </a:schemeClr>
+          </a:lnRef>
+          <a:fillRef idx="1">
+            <a:schemeClr val="accent1"/>
+          </a:fillRef>
+          <a:effectRef idx="0">
+            <a:schemeClr val="accent1"/>
+          </a:effectRef>
+          <a:fontRef idx="minor">
+            <a:schemeClr val="lt1"/>
+          </a:fontRef>
+        </p:style>
+        <p:txBody>
+          <a:bodyPr rtlCol="0" anchor="ctr"/>
+          <a:lstStyle/>
+          <a:p>
+            <a:pPr algn="ctr"/>
+            <a:endParaRPr lang="en-US"/>
+          </a:p>
+        </p:txBody>
+      </p:sp>
+      <p:sp>
+        <p:nvSpPr>
+          <p:cNvPr id="64" name="Rectangle 63">
+            <a:extLst>
+              <a:ext uri="{FF2B5EF4-FFF2-40B4-BE49-F238E27FC236}">
+                <a16:creationId xmlns:a16="http://schemas.microsoft.com/office/drawing/2014/main" id="{DA89FFCC-3BA1-4D67-987E-31BADE755710}"/>
+              </a:ext>
+            </a:extLst>
+          </p:cNvPr>
+          <p:cNvSpPr/>
+          <p:nvPr/>
+        </p:nvSpPr>
+        <p:spPr>
+          <a:xfrm>
+            <a:off x="11798020" y="15809063"/>
+            <a:ext cx="4408768" cy="4524315"/>
+          </a:xfrm>
+          <a:prstGeom prst="rect">
+            <a:avLst/>
+          </a:prstGeom>
+        </p:spPr>
+        <p:txBody>
+          <a:bodyPr wrap="square">
+            <a:spAutoFit/>
+          </a:bodyPr>
+          <a:lstStyle/>
+          <a:p>
+            <a:r>
+              <a:rPr lang="en-US" sz="2400" dirty="0">
+                <a:latin typeface="BentonSans Regular" panose="02000503000000020004" pitchFamily="50" charset="0"/>
+              </a:rPr>
+              <a:t>We used a variation of YOLO v2, trained on a dataset of photos with bounding boxes around hands.</a:t>
+            </a:r>
+          </a:p>
+          <a:p>
+            <a:endParaRPr lang="en-US" sz="2400" dirty="0">
+              <a:latin typeface="BentonSans Regular" panose="02000503000000020004" pitchFamily="50" charset="0"/>
+            </a:endParaRPr>
+          </a:p>
+          <a:p>
+            <a:r>
+              <a:rPr lang="en-US" sz="2400" dirty="0">
+                <a:latin typeface="BentonSans Regular" panose="02000503000000020004" pitchFamily="50" charset="0"/>
+              </a:rPr>
+              <a:t>Input images from the camera feed are passed into this network, and the bounding box around a hand returned is cropped from the image, then passed to the classifier.</a:t>
+            </a:r>
+            <a:endParaRPr lang="en-US" sz="2400" dirty="0"/>
+          </a:p>
+        </p:txBody>
+      </p:sp>
+      <p:sp>
+        <p:nvSpPr>
+          <p:cNvPr id="65" name="Rectangle 64">
+            <a:extLst>
+              <a:ext uri="{FF2B5EF4-FFF2-40B4-BE49-F238E27FC236}">
+                <a16:creationId xmlns:a16="http://schemas.microsoft.com/office/drawing/2014/main" id="{77F37001-3A4A-4C51-8C71-BA7DBCA533AC}"/>
+              </a:ext>
+            </a:extLst>
+          </p:cNvPr>
+          <p:cNvSpPr/>
+          <p:nvPr/>
+        </p:nvSpPr>
+        <p:spPr>
+          <a:xfrm>
+            <a:off x="16815080" y="15808942"/>
+            <a:ext cx="4408768" cy="4893647"/>
+          </a:xfrm>
+          <a:prstGeom prst="rect">
+            <a:avLst/>
+          </a:prstGeom>
+        </p:spPr>
+        <p:txBody>
+          <a:bodyPr wrap="square">
+            <a:spAutoFit/>
+          </a:bodyPr>
+          <a:lstStyle/>
+          <a:p>
+            <a:r>
+              <a:rPr lang="en-US" sz="2400" dirty="0">
+                <a:latin typeface="BentonSans Regular" panose="02000503000000020004" pitchFamily="50" charset="0"/>
+              </a:rPr>
+              <a:t>For classifying the letters from hands, we merged together several datasets of ASL letters. Classification is performed on a 28x28 resized image.</a:t>
+            </a:r>
+          </a:p>
+          <a:p>
+            <a:endParaRPr lang="en-US" sz="2400" dirty="0">
+              <a:latin typeface="BentonSans Regular" panose="02000503000000020004" pitchFamily="50" charset="0"/>
+            </a:endParaRPr>
+          </a:p>
+          <a:p>
+            <a:r>
+              <a:rPr lang="en-US" sz="2400" dirty="0">
+                <a:latin typeface="BentonSans Regular" panose="02000503000000020004" pitchFamily="50" charset="0"/>
+              </a:rPr>
+              <a:t>We augmented these datasets with transformed and translated duplicates of images within each dataset.</a:t>
+            </a:r>
+          </a:p>
+          <a:p>
+            <a:endParaRPr lang="en-US" sz="2400" dirty="0">
+              <a:latin typeface="BentonSans Regular" panose="02000503000000020004" pitchFamily="50" charset="0"/>
+            </a:endParaRPr>
+          </a:p>
+          <a:p>
+            <a:endParaRPr lang="en-US" sz="2400" dirty="0"/>
+          </a:p>
+        </p:txBody>
+      </p:sp>
+      <p:sp>
+        <p:nvSpPr>
+          <p:cNvPr id="66" name="Rectangle 65">
+            <a:extLst>
+              <a:ext uri="{FF2B5EF4-FFF2-40B4-BE49-F238E27FC236}">
+                <a16:creationId xmlns:a16="http://schemas.microsoft.com/office/drawing/2014/main" id="{7366094C-BB6C-4A49-9348-25813FD733BA}"/>
+              </a:ext>
+            </a:extLst>
+          </p:cNvPr>
+          <p:cNvSpPr/>
+          <p:nvPr/>
+        </p:nvSpPr>
+        <p:spPr>
+          <a:xfrm>
+            <a:off x="18716628" y="13145337"/>
+            <a:ext cx="2550118" cy="830997"/>
+          </a:xfrm>
+          <a:prstGeom prst="rect">
+            <a:avLst/>
+          </a:prstGeom>
+        </p:spPr>
+        <p:txBody>
+          <a:bodyPr wrap="square">
+            <a:spAutoFit/>
+          </a:bodyPr>
+          <a:lstStyle/>
+          <a:p>
+            <a:r>
+              <a:rPr lang="en-US" sz="2400" dirty="0">
+                <a:latin typeface="BentonSans Regular" panose="02000503000000020004" pitchFamily="50" charset="0"/>
+              </a:rPr>
+              <a:t>Classifier architecture</a:t>
+            </a:r>
+            <a:endParaRPr lang="en-US" sz="2400" dirty="0"/>
+          </a:p>
+        </p:txBody>
+      </p:sp>
+      <p:pic>
+        <p:nvPicPr>
+          <p:cNvPr id="68" name="Picture 67" descr="A screenshot of a cell phone&#10;&#10;Description generated with very high confidence">
+            <a:extLst>
+              <a:ext uri="{FF2B5EF4-FFF2-40B4-BE49-F238E27FC236}">
+                <a16:creationId xmlns:a16="http://schemas.microsoft.com/office/drawing/2014/main" id="{91A2F9F8-3A8D-4ACE-B11E-E8A860DD5C39}"/>
+              </a:ext>
+            </a:extLst>
+          </p:cNvPr>
+          <p:cNvPicPr>
+            <a:picLocks noChangeAspect="1"/>
+          </p:cNvPicPr>
+          <p:nvPr/>
+        </p:nvPicPr>
+        <p:blipFill>
+          <a:blip r:embed="rId5">
+            <a:extLst>
+              <a:ext uri="{28A0092B-C50C-407E-A947-70E740481C1C}">
+                <a14:useLocalDpi xmlns:a14="http://schemas.microsoft.com/office/drawing/2010/main" val="0"/>
+              </a:ext>
+            </a:extLst>
+          </a:blip>
+          <a:stretch>
+            <a:fillRect/>
+          </a:stretch>
+        </p:blipFill>
+        <p:spPr>
+          <a:xfrm rot="16200000">
+            <a:off x="13778178" y="11129773"/>
+            <a:ext cx="1725685" cy="5044327"/>
+          </a:xfrm>
+          <a:prstGeom prst="rect">
+            <a:avLst/>
+          </a:prstGeom>
+        </p:spPr>
+      </p:pic>
+      <p:pic>
+        <p:nvPicPr>
+          <p:cNvPr id="70" name="Picture 69" descr="A bathroom with a sink and a mirror&#10;&#10;Description generated with very high confidence">
+            <a:extLst>
+              <a:ext uri="{FF2B5EF4-FFF2-40B4-BE49-F238E27FC236}">
+                <a16:creationId xmlns:a16="http://schemas.microsoft.com/office/drawing/2014/main" id="{23BB58B4-2BAD-46D9-8873-E89EFB4BF9B8}"/>
+              </a:ext>
+            </a:extLst>
+          </p:cNvPr>
+          <p:cNvPicPr>
+            <a:picLocks noChangeAspect="1"/>
+          </p:cNvPicPr>
+          <p:nvPr/>
+        </p:nvPicPr>
+        <p:blipFill>
+          <a:blip r:embed="rId6">
+            <a:extLst>
+              <a:ext uri="{28A0092B-C50C-407E-A947-70E740481C1C}">
+                <a14:useLocalDpi xmlns:a14="http://schemas.microsoft.com/office/drawing/2010/main" val="0"/>
+              </a:ext>
+            </a:extLst>
+          </a:blip>
+          <a:stretch>
+            <a:fillRect/>
+          </a:stretch>
+        </p:blipFill>
+        <p:spPr>
+          <a:xfrm>
+            <a:off x="26250899" y="7612990"/>
+            <a:ext cx="3094622" cy="2061019"/>
+          </a:xfrm>
+          <a:prstGeom prst="rect">
+            <a:avLst/>
+          </a:prstGeom>
+        </p:spPr>
+      </p:pic>
+      <p:pic>
+        <p:nvPicPr>
+          <p:cNvPr id="72" name="Picture 71" descr="A person in a car&#10;&#10;Description generated with high confidence">
+            <a:extLst>
+              <a:ext uri="{FF2B5EF4-FFF2-40B4-BE49-F238E27FC236}">
+                <a16:creationId xmlns:a16="http://schemas.microsoft.com/office/drawing/2014/main" id="{C895795A-4FA1-458A-8950-32AFE572015C}"/>
+              </a:ext>
+            </a:extLst>
+          </p:cNvPr>
+          <p:cNvPicPr>
+            <a:picLocks noChangeAspect="1"/>
+          </p:cNvPicPr>
+          <p:nvPr/>
+        </p:nvPicPr>
+        <p:blipFill>
+          <a:blip r:embed="rId7">
+            <a:extLst>
+              <a:ext uri="{28A0092B-C50C-407E-A947-70E740481C1C}">
+                <a14:useLocalDpi xmlns:a14="http://schemas.microsoft.com/office/drawing/2010/main" val="0"/>
+              </a:ext>
+            </a:extLst>
+          </a:blip>
+          <a:stretch>
+            <a:fillRect/>
+          </a:stretch>
+        </p:blipFill>
+        <p:spPr>
+          <a:xfrm>
+            <a:off x="23393399" y="7606889"/>
+            <a:ext cx="2857500" cy="2143125"/>
+          </a:xfrm>
+          <a:prstGeom prst="rect">
+            <a:avLst/>
+          </a:prstGeom>
+        </p:spPr>
+      </p:pic>
+      <p:graphicFrame>
+        <p:nvGraphicFramePr>
+          <p:cNvPr id="75" name="Chart 74">
+            <a:extLst>
+              <a:ext uri="{FF2B5EF4-FFF2-40B4-BE49-F238E27FC236}">
+                <a16:creationId xmlns:a16="http://schemas.microsoft.com/office/drawing/2014/main" id="{D0E02888-CF53-4AB2-92B8-CF75B21DCC10}"/>
+              </a:ext>
+            </a:extLst>
+          </p:cNvPr>
+          <p:cNvGraphicFramePr/>
+          <p:nvPr>
+            <p:extLst>
+              <p:ext uri="{D42A27DB-BD31-4B8C-83A1-F6EECF244321}">
+                <p14:modId xmlns:p14="http://schemas.microsoft.com/office/powerpoint/2010/main" val="3653618625"/>
+              </p:ext>
+            </p:extLst>
+          </p:nvPr>
+        </p:nvGraphicFramePr>
+        <p:xfrm>
+          <a:off x="23289784" y="13570798"/>
+          <a:ext cx="7837916" cy="2238144"/>
+        </p:xfrm>
+        <a:graphic>
+          <a:graphicData uri="http://schemas.openxmlformats.org/drawingml/2006/chart">
+            <c:chart xmlns:c="http://schemas.openxmlformats.org/drawingml/2006/chart" xmlns:r="http://schemas.openxmlformats.org/officeDocument/2006/relationships" r:id="rId8"/>
+          </a:graphicData>
+        </a:graphic>
+      </p:graphicFrame>
     </p:spTree>
     <p:extLst>
       <p:ext uri="{BB962C8B-B14F-4D97-AF65-F5344CB8AC3E}">

</xml_diff>